<commit_message>
added explanations of derivatives
</commit_message>
<xml_diff>
--- a/04. Batch Normalization & Dropout/Dropout-BN.pptx
+++ b/04. Batch Normalization & Dropout/Dropout-BN.pptx
@@ -5,7 +5,7 @@
     <p:sldMasterId id="2147483660" r:id="rId1"/>
   </p:sldMasterIdLst>
   <p:notesMasterIdLst>
-    <p:notesMasterId r:id="rId26"/>
+    <p:notesMasterId r:id="rId29"/>
   </p:notesMasterIdLst>
   <p:sldIdLst>
     <p:sldId id="256" r:id="rId2"/>
@@ -23,15 +23,18 @@
     <p:sldId id="284" r:id="rId14"/>
     <p:sldId id="274" r:id="rId15"/>
     <p:sldId id="275" r:id="rId16"/>
-    <p:sldId id="278" r:id="rId17"/>
-    <p:sldId id="277" r:id="rId18"/>
-    <p:sldId id="276" r:id="rId19"/>
-    <p:sldId id="279" r:id="rId20"/>
-    <p:sldId id="280" r:id="rId21"/>
-    <p:sldId id="282" r:id="rId22"/>
-    <p:sldId id="283" r:id="rId23"/>
-    <p:sldId id="269" r:id="rId24"/>
-    <p:sldId id="268" r:id="rId25"/>
+    <p:sldId id="285" r:id="rId17"/>
+    <p:sldId id="286" r:id="rId18"/>
+    <p:sldId id="287" r:id="rId19"/>
+    <p:sldId id="278" r:id="rId20"/>
+    <p:sldId id="277" r:id="rId21"/>
+    <p:sldId id="276" r:id="rId22"/>
+    <p:sldId id="279" r:id="rId23"/>
+    <p:sldId id="280" r:id="rId24"/>
+    <p:sldId id="282" r:id="rId25"/>
+    <p:sldId id="283" r:id="rId26"/>
+    <p:sldId id="269" r:id="rId27"/>
+    <p:sldId id="268" r:id="rId28"/>
   </p:sldIdLst>
   <p:sldSz cx="12192000" cy="6858000"/>
   <p:notesSz cx="6858000" cy="9144000"/>
@@ -224,7 +227,7 @@
           <a:p>
             <a:fld id="{C70EA988-6836-4699-A3E1-87B96EFC78DA}" type="datetimeFigureOut">
               <a:rPr lang="ko-KR" altLang="en-US" smtClean="0"/>
-              <a:t>2017-12-26</a:t>
+              <a:t>2018-01-02</a:t>
             </a:fld>
             <a:endParaRPr lang="ko-KR" altLang="en-US"/>
           </a:p>
@@ -717,7 +720,7 @@
           <a:p>
             <a:fld id="{FB723FC9-7FB9-4C4F-8EDC-230AEC88725B}" type="datetimeFigureOut">
               <a:rPr kumimoji="1" lang="ko-KR" altLang="en-US" smtClean="0"/>
-              <a:t>2017-12-26</a:t>
+              <a:t>2018-01-02</a:t>
             </a:fld>
             <a:endParaRPr kumimoji="1" lang="ko-KR" altLang="en-US"/>
           </a:p>
@@ -925,7 +928,7 @@
           <a:p>
             <a:fld id="{FB723FC9-7FB9-4C4F-8EDC-230AEC88725B}" type="datetimeFigureOut">
               <a:rPr kumimoji="1" lang="ko-KR" altLang="en-US" smtClean="0"/>
-              <a:t>2017-12-26</a:t>
+              <a:t>2018-01-02</a:t>
             </a:fld>
             <a:endParaRPr kumimoji="1" lang="ko-KR" altLang="en-US"/>
           </a:p>
@@ -1181,7 +1184,7 @@
           <a:p>
             <a:fld id="{FB723FC9-7FB9-4C4F-8EDC-230AEC88725B}" type="datetimeFigureOut">
               <a:rPr kumimoji="1" lang="ko-KR" altLang="en-US" smtClean="0"/>
-              <a:t>2017-12-26</a:t>
+              <a:t>2018-01-02</a:t>
             </a:fld>
             <a:endParaRPr kumimoji="1" lang="ko-KR" altLang="en-US"/>
           </a:p>
@@ -1355,7 +1358,7 @@
           <a:p>
             <a:fld id="{FB723FC9-7FB9-4C4F-8EDC-230AEC88725B}" type="datetimeFigureOut">
               <a:rPr kumimoji="1" lang="ko-KR" altLang="en-US" smtClean="0"/>
-              <a:t>2017-12-26</a:t>
+              <a:t>2018-01-02</a:t>
             </a:fld>
             <a:endParaRPr kumimoji="1" lang="ko-KR" altLang="en-US"/>
           </a:p>
@@ -1698,7 +1701,7 @@
           <a:p>
             <a:fld id="{FB723FC9-7FB9-4C4F-8EDC-230AEC88725B}" type="datetimeFigureOut">
               <a:rPr kumimoji="1" lang="ko-KR" altLang="en-US" smtClean="0"/>
-              <a:t>2017-12-26</a:t>
+              <a:t>2018-01-02</a:t>
             </a:fld>
             <a:endParaRPr kumimoji="1" lang="ko-KR" altLang="en-US"/>
           </a:p>
@@ -1973,7 +1976,7 @@
           <a:p>
             <a:fld id="{FB723FC9-7FB9-4C4F-8EDC-230AEC88725B}" type="datetimeFigureOut">
               <a:rPr kumimoji="1" lang="ko-KR" altLang="en-US" smtClean="0"/>
-              <a:t>2017-12-26</a:t>
+              <a:t>2018-01-02</a:t>
             </a:fld>
             <a:endParaRPr kumimoji="1" lang="ko-KR" altLang="en-US"/>
           </a:p>
@@ -2352,7 +2355,7 @@
           <a:p>
             <a:fld id="{FB723FC9-7FB9-4C4F-8EDC-230AEC88725B}" type="datetimeFigureOut">
               <a:rPr kumimoji="1" lang="ko-KR" altLang="en-US" smtClean="0"/>
-              <a:t>2017-12-26</a:t>
+              <a:t>2018-01-02</a:t>
             </a:fld>
             <a:endParaRPr kumimoji="1" lang="ko-KR" altLang="en-US"/>
           </a:p>
@@ -2470,7 +2473,7 @@
           <a:p>
             <a:fld id="{FB723FC9-7FB9-4C4F-8EDC-230AEC88725B}" type="datetimeFigureOut">
               <a:rPr kumimoji="1" lang="ko-KR" altLang="en-US" smtClean="0"/>
-              <a:t>2017-12-26</a:t>
+              <a:t>2018-01-02</a:t>
             </a:fld>
             <a:endParaRPr kumimoji="1" lang="ko-KR" altLang="en-US"/>
           </a:p>
@@ -2641,7 +2644,7 @@
           <a:p>
             <a:fld id="{FB723FC9-7FB9-4C4F-8EDC-230AEC88725B}" type="datetimeFigureOut">
               <a:rPr kumimoji="1" lang="ko-KR" altLang="en-US" smtClean="0"/>
-              <a:t>2017-12-26</a:t>
+              <a:t>2018-01-02</a:t>
             </a:fld>
             <a:endParaRPr kumimoji="1" lang="ko-KR" altLang="en-US"/>
           </a:p>
@@ -2995,7 +2998,7 @@
           <a:p>
             <a:fld id="{FB723FC9-7FB9-4C4F-8EDC-230AEC88725B}" type="datetimeFigureOut">
               <a:rPr kumimoji="1" lang="ko-KR" altLang="en-US" smtClean="0"/>
-              <a:t>2017-12-26</a:t>
+              <a:t>2018-01-02</a:t>
             </a:fld>
             <a:endParaRPr kumimoji="1" lang="ko-KR" altLang="en-US"/>
           </a:p>
@@ -3377,7 +3380,7 @@
           <a:p>
             <a:fld id="{FB723FC9-7FB9-4C4F-8EDC-230AEC88725B}" type="datetimeFigureOut">
               <a:rPr kumimoji="1" lang="ko-KR" altLang="en-US" smtClean="0"/>
-              <a:t>2017-12-26</a:t>
+              <a:t>2018-01-02</a:t>
             </a:fld>
             <a:endParaRPr kumimoji="1" lang="ko-KR" altLang="en-US"/>
           </a:p>
@@ -3664,7 +3667,7 @@
           <a:p>
             <a:fld id="{FB723FC9-7FB9-4C4F-8EDC-230AEC88725B}" type="datetimeFigureOut">
               <a:rPr kumimoji="1" lang="ko-KR" altLang="en-US" smtClean="0"/>
-              <a:t>2017-12-26</a:t>
+              <a:t>2018-01-02</a:t>
             </a:fld>
             <a:endParaRPr kumimoji="1" lang="ko-KR" altLang="en-US"/>
           </a:p>
@@ -4498,100 +4501,243 @@
           </a:p>
         </p:txBody>
       </p:sp>
-      <p:sp>
-        <p:nvSpPr>
-          <p:cNvPr id="3" name="내용 개체 틀 2">
-            <a:extLst>
-              <a:ext uri="{FF2B5EF4-FFF2-40B4-BE49-F238E27FC236}">
-                <a16:creationId xmlns:a16="http://schemas.microsoft.com/office/drawing/2014/main" id="{12BC1828-6619-4305-8D66-B3B82EC770A8}"/>
-              </a:ext>
-            </a:extLst>
-          </p:cNvPr>
-          <p:cNvSpPr>
-            <a:spLocks noGrp="1"/>
-          </p:cNvSpPr>
-          <p:nvPr>
-            <p:ph idx="1"/>
-          </p:nvPr>
-        </p:nvSpPr>
-        <p:spPr/>
-        <p:txBody>
-          <a:bodyPr/>
-          <a:lstStyle/>
-          <a:p>
-            <a:r>
-              <a:rPr lang="ko-KR" altLang="en-US" dirty="0"/>
-              <a:t>시도 </a:t>
-            </a:r>
-            <a:r>
-              <a:rPr lang="en-US" altLang="ko-KR" dirty="0"/>
-              <a:t>1. </a:t>
-            </a:r>
-            <a:r>
-              <a:rPr lang="ko-KR" altLang="en-US" dirty="0"/>
-              <a:t>매 번 학습이 끝난 후</a:t>
-            </a:r>
-            <a:r>
-              <a:rPr lang="en-US" altLang="ko-KR" dirty="0"/>
-              <a:t>, whitening</a:t>
-            </a:r>
-            <a:r>
-              <a:rPr lang="ko-KR" altLang="en-US" dirty="0"/>
-              <a:t>을 해 준다</a:t>
-            </a:r>
-            <a:r>
-              <a:rPr lang="en-US" altLang="ko-KR" dirty="0"/>
-              <a:t>.</a:t>
-            </a:r>
-          </a:p>
-          <a:p>
-            <a:endParaRPr lang="en-US" altLang="ko-KR" dirty="0"/>
-          </a:p>
-          <a:p>
-            <a:r>
-              <a:rPr lang="en-US" altLang="ko-KR" dirty="0"/>
-              <a:t>Y = </a:t>
-            </a:r>
-            <a:r>
-              <a:rPr lang="en-US" altLang="ko-KR" dirty="0" err="1"/>
-              <a:t>x+b</a:t>
-            </a:r>
-            <a:endParaRPr lang="en-US" altLang="ko-KR" dirty="0"/>
-          </a:p>
-          <a:p>
-            <a:r>
-              <a:rPr lang="en-US" altLang="ko-KR" dirty="0"/>
-              <a:t>Y’ = Y-E[Y]</a:t>
-            </a:r>
-          </a:p>
-          <a:p>
-            <a:endParaRPr lang="en-US" altLang="ko-KR" dirty="0"/>
-          </a:p>
-          <a:p>
-            <a:r>
-              <a:rPr lang="en-US" altLang="ko-KR" dirty="0"/>
-              <a:t>b</a:t>
-            </a:r>
-            <a:r>
-              <a:rPr lang="ko-KR" altLang="en-US" dirty="0"/>
-              <a:t>가 변했을 때</a:t>
-            </a:r>
-            <a:r>
-              <a:rPr lang="en-US" altLang="ko-KR" dirty="0"/>
-              <a:t>, Y’</a:t>
-            </a:r>
-            <a:r>
-              <a:rPr lang="ko-KR" altLang="en-US" dirty="0"/>
-              <a:t>는</a:t>
-            </a:r>
-            <a:r>
-              <a:rPr lang="en-US" altLang="ko-KR" dirty="0"/>
-              <a:t>?</a:t>
-            </a:r>
-            <a:endParaRPr lang="ko-KR" altLang="en-US" dirty="0"/>
-          </a:p>
-        </p:txBody>
-      </p:sp>
+      <mc:AlternateContent xmlns:mc="http://schemas.openxmlformats.org/markup-compatibility/2006">
+        <mc:Choice xmlns:a14="http://schemas.microsoft.com/office/drawing/2010/main" Requires="a14">
+          <p:sp>
+            <p:nvSpPr>
+              <p:cNvPr id="3" name="내용 개체 틀 2">
+                <a:extLst>
+                  <a:ext uri="{FF2B5EF4-FFF2-40B4-BE49-F238E27FC236}">
+                    <a16:creationId xmlns:a16="http://schemas.microsoft.com/office/drawing/2014/main" id="{12BC1828-6619-4305-8D66-B3B82EC770A8}"/>
+                  </a:ext>
+                </a:extLst>
+              </p:cNvPr>
+              <p:cNvSpPr>
+                <a:spLocks noGrp="1"/>
+              </p:cNvSpPr>
+              <p:nvPr>
+                <p:ph idx="1"/>
+              </p:nvPr>
+            </p:nvSpPr>
+            <p:spPr/>
+            <p:txBody>
+              <a:bodyPr/>
+              <a:lstStyle/>
+              <a:p>
+                <a:r>
+                  <a:rPr lang="ko-KR" altLang="en-US" dirty="0"/>
+                  <a:t>시도 </a:t>
+                </a:r>
+                <a:r>
+                  <a:rPr lang="en-US" altLang="ko-KR" dirty="0"/>
+                  <a:t>1. </a:t>
+                </a:r>
+                <a:r>
+                  <a:rPr lang="ko-KR" altLang="en-US" dirty="0"/>
+                  <a:t>매 번 학습이 끝난 후</a:t>
+                </a:r>
+                <a:r>
+                  <a:rPr lang="en-US" altLang="ko-KR" dirty="0"/>
+                  <a:t>, whitening</a:t>
+                </a:r>
+                <a:r>
+                  <a:rPr lang="ko-KR" altLang="en-US" dirty="0"/>
+                  <a:t>을 해 준다</a:t>
+                </a:r>
+                <a:r>
+                  <a:rPr lang="en-US" altLang="ko-KR" dirty="0"/>
+                  <a:t>.</a:t>
+                </a:r>
+              </a:p>
+              <a:p>
+                <a:endParaRPr lang="en-US" altLang="ko-KR" dirty="0"/>
+              </a:p>
+              <a:p>
+                <a:r>
+                  <a:rPr lang="en-US" altLang="ko-KR" dirty="0"/>
+                  <a:t>Y = </a:t>
+                </a:r>
+                <a:r>
+                  <a:rPr lang="en-US" altLang="ko-KR" dirty="0" err="1"/>
+                  <a:t>x+b</a:t>
+                </a:r>
+                <a:r>
+                  <a:rPr lang="en-US" altLang="ko-KR" dirty="0"/>
+                  <a:t> (x</a:t>
+                </a:r>
+                <a:r>
+                  <a:rPr lang="ko-KR" altLang="en-US" dirty="0"/>
+                  <a:t>는 스칼라 값</a:t>
+                </a:r>
+                <a:r>
+                  <a:rPr lang="en-US" altLang="ko-KR" dirty="0"/>
+                  <a:t>)</a:t>
+                </a:r>
+              </a:p>
+              <a:p>
+                <a:r>
+                  <a:rPr lang="en-US" altLang="ko-KR" dirty="0"/>
+                  <a:t>Y’ = Y-E[Y]</a:t>
+                </a:r>
+              </a:p>
+              <a:p>
+                <a:endParaRPr lang="en-US" altLang="ko-KR" dirty="0"/>
+              </a:p>
+              <a:p>
+                <a:r>
+                  <a:rPr lang="en-US" altLang="ko-KR" dirty="0"/>
+                  <a:t>b</a:t>
+                </a:r>
+                <a:r>
+                  <a:rPr lang="ko-KR" altLang="en-US" dirty="0"/>
+                  <a:t>가 변했을 때</a:t>
+                </a:r>
+                <a:r>
+                  <a:rPr lang="en-US" altLang="ko-KR" dirty="0"/>
+                  <a:t>, Y’</a:t>
+                </a:r>
+                <a:r>
+                  <a:rPr lang="ko-KR" altLang="en-US" dirty="0"/>
+                  <a:t>는</a:t>
+                </a:r>
+                <a:r>
+                  <a:rPr lang="en-US" altLang="ko-KR" dirty="0"/>
+                  <a:t>?</a:t>
+                </a:r>
+              </a:p>
+              <a:p>
+                <a:endParaRPr lang="en-US" altLang="ko-KR" dirty="0"/>
+              </a:p>
+              <a:p>
+                <a:r>
+                  <a:rPr lang="en-US" altLang="ko-KR" dirty="0"/>
+                  <a:t>-&gt; optimizing</a:t>
+                </a:r>
+                <a:r>
+                  <a:rPr lang="ko-KR" altLang="en-US" dirty="0"/>
+                  <a:t> 과정에 </a:t>
+                </a:r>
+                <a14:m>
+                  <m:oMath xmlns:m="http://schemas.openxmlformats.org/officeDocument/2006/math">
+                    <m:f>
+                      <m:fPr>
+                        <m:ctrlPr>
+                          <a:rPr lang="en-US" altLang="ko-KR" i="1" smtClean="0">
+                            <a:latin typeface="Cambria Math" panose="02040503050406030204" pitchFamily="18" charset="0"/>
+                          </a:rPr>
+                        </m:ctrlPr>
+                      </m:fPr>
+                      <m:num>
+                        <m:r>
+                          <a:rPr lang="ko-KR" altLang="en-US" i="1" smtClean="0">
+                            <a:latin typeface="Cambria Math" panose="02040503050406030204" pitchFamily="18" charset="0"/>
+                          </a:rPr>
+                          <m:t>𝜕</m:t>
+                        </m:r>
+                        <m:r>
+                          <a:rPr lang="en-US" altLang="ko-KR" b="0" i="1" smtClean="0">
+                            <a:latin typeface="Cambria Math" panose="02040503050406030204" pitchFamily="18" charset="0"/>
+                          </a:rPr>
+                          <m:t>𝐿𝑜𝑠𝑠</m:t>
+                        </m:r>
+                      </m:num>
+                      <m:den>
+                        <m:r>
+                          <a:rPr lang="ko-KR" altLang="en-US" i="1" smtClean="0">
+                            <a:latin typeface="Cambria Math" panose="02040503050406030204" pitchFamily="18" charset="0"/>
+                          </a:rPr>
+                          <m:t>𝜕</m:t>
+                        </m:r>
+                        <m:r>
+                          <a:rPr lang="en-US" altLang="ko-KR" b="0" i="1" smtClean="0">
+                            <a:latin typeface="Cambria Math" panose="02040503050406030204" pitchFamily="18" charset="0"/>
+                          </a:rPr>
+                          <m:t>𝐸</m:t>
+                        </m:r>
+                        <m:d>
+                          <m:dPr>
+                            <m:begChr m:val="["/>
+                            <m:endChr m:val="]"/>
+                            <m:ctrlPr>
+                              <a:rPr lang="en-US" altLang="ko-KR" b="0" i="1" smtClean="0">
+                                <a:latin typeface="Cambria Math" panose="02040503050406030204" pitchFamily="18" charset="0"/>
+                              </a:rPr>
+                            </m:ctrlPr>
+                          </m:dPr>
+                          <m:e>
+                            <m:r>
+                              <a:rPr lang="en-US" altLang="ko-KR" b="0" i="1" smtClean="0">
+                                <a:latin typeface="Cambria Math" panose="02040503050406030204" pitchFamily="18" charset="0"/>
+                              </a:rPr>
+                              <m:t>𝑌</m:t>
+                            </m:r>
+                          </m:e>
+                        </m:d>
+                      </m:den>
+                    </m:f>
+                  </m:oMath>
+                </a14:m>
+                <a:r>
+                  <a:rPr lang="ko-KR" altLang="en-US" dirty="0"/>
+                  <a:t>도 학습해야 한다</a:t>
+                </a:r>
+                <a:r>
+                  <a:rPr lang="en-US" altLang="ko-KR" dirty="0"/>
+                  <a:t>. (Var[Y]</a:t>
+                </a:r>
+                <a:r>
+                  <a:rPr lang="ko-KR" altLang="en-US" dirty="0"/>
+                  <a:t>도 필요하다</a:t>
+                </a:r>
+                <a:r>
+                  <a:rPr lang="en-US" altLang="ko-KR" dirty="0"/>
+                  <a:t>.)</a:t>
+                </a:r>
+                <a:endParaRPr lang="ko-KR" altLang="en-US" dirty="0"/>
+              </a:p>
+            </p:txBody>
+          </p:sp>
+        </mc:Choice>
+        <mc:Fallback>
+          <p:sp>
+            <p:nvSpPr>
+              <p:cNvPr id="3" name="내용 개체 틀 2">
+                <a:extLst>
+                  <a:ext uri="{FF2B5EF4-FFF2-40B4-BE49-F238E27FC236}">
+                    <a16:creationId xmlns:a16="http://schemas.microsoft.com/office/drawing/2014/main" id="{12BC1828-6619-4305-8D66-B3B82EC770A8}"/>
+                  </a:ext>
+                </a:extLst>
+              </p:cNvPr>
+              <p:cNvSpPr>
+                <a:spLocks noGrp="1" noRot="1" noChangeAspect="1" noMove="1" noResize="1" noEditPoints="1" noAdjustHandles="1" noChangeArrowheads="1" noChangeShapeType="1" noTextEdit="1"/>
+              </p:cNvSpPr>
+              <p:nvPr>
+                <p:ph idx="1"/>
+              </p:nvPr>
+            </p:nvSpPr>
+            <p:spPr>
+              <a:blipFill>
+                <a:blip r:embed="rId2"/>
+                <a:stretch>
+                  <a:fillRect l="-606" t="-1970"/>
+                </a:stretch>
+              </a:blipFill>
+            </p:spPr>
+            <p:txBody>
+              <a:bodyPr/>
+              <a:lstStyle/>
+              <a:p>
+                <a:r>
+                  <a:rPr lang="ko-KR" altLang="en-US">
+                    <a:noFill/>
+                  </a:rPr>
+                  <a:t> </a:t>
+                </a:r>
+              </a:p>
+            </p:txBody>
+          </p:sp>
+        </mc:Fallback>
+      </mc:AlternateContent>
     </p:spTree>
     <p:extLst>
       <p:ext uri="{BB962C8B-B14F-4D97-AF65-F5344CB8AC3E}">
@@ -4651,93 +4797,607 @@
           </a:p>
         </p:txBody>
       </p:sp>
-      <p:sp>
-        <p:nvSpPr>
-          <p:cNvPr id="3" name="내용 개체 틀 2">
-            <a:extLst>
-              <a:ext uri="{FF2B5EF4-FFF2-40B4-BE49-F238E27FC236}">
-                <a16:creationId xmlns:a16="http://schemas.microsoft.com/office/drawing/2014/main" id="{12BC1828-6619-4305-8D66-B3B82EC770A8}"/>
-              </a:ext>
-            </a:extLst>
-          </p:cNvPr>
-          <p:cNvSpPr>
-            <a:spLocks noGrp="1"/>
-          </p:cNvSpPr>
-          <p:nvPr>
-            <p:ph idx="1"/>
-          </p:nvPr>
-        </p:nvSpPr>
-        <p:spPr/>
-        <p:txBody>
-          <a:bodyPr/>
-          <a:lstStyle/>
-          <a:p>
-            <a:r>
-              <a:rPr lang="ko-KR" altLang="en-US" dirty="0"/>
-              <a:t>시도 </a:t>
-            </a:r>
-            <a:r>
-              <a:rPr lang="en-US" altLang="ko-KR" dirty="0"/>
-              <a:t>2. </a:t>
-            </a:r>
-            <a:r>
-              <a:rPr lang="ko-KR" altLang="en-US" dirty="0"/>
-              <a:t>모든 </a:t>
-            </a:r>
-            <a:r>
-              <a:rPr lang="en-US" altLang="ko-KR" dirty="0"/>
-              <a:t>data </a:t>
-            </a:r>
-            <a:r>
-              <a:rPr lang="ko-KR" altLang="en-US" dirty="0"/>
-              <a:t>분포를 고려해 </a:t>
-            </a:r>
-            <a:r>
-              <a:rPr lang="en-US" altLang="ko-KR" dirty="0"/>
-              <a:t>normalization</a:t>
-            </a:r>
-            <a:r>
-              <a:rPr lang="ko-KR" altLang="en-US" dirty="0"/>
-              <a:t>을 진행한다</a:t>
-            </a:r>
-            <a:r>
-              <a:rPr lang="en-US" altLang="ko-KR" dirty="0"/>
-              <a:t>.</a:t>
-            </a:r>
-            <a:endParaRPr lang="ko-KR" altLang="en-US" dirty="0"/>
-          </a:p>
-        </p:txBody>
-      </p:sp>
-      <p:pic>
-        <p:nvPicPr>
-          <p:cNvPr id="5" name="그림 4">
-            <a:extLst>
-              <a:ext uri="{FF2B5EF4-FFF2-40B4-BE49-F238E27FC236}">
-                <a16:creationId xmlns:a16="http://schemas.microsoft.com/office/drawing/2014/main" id="{A81AFE24-29BE-43EE-9010-FCD141E9C877}"/>
-              </a:ext>
-            </a:extLst>
-          </p:cNvPr>
-          <p:cNvPicPr>
-            <a:picLocks noChangeAspect="1"/>
-          </p:cNvPicPr>
-          <p:nvPr/>
-        </p:nvPicPr>
-        <p:blipFill>
-          <a:blip r:embed="rId2"/>
-          <a:stretch>
-            <a:fillRect/>
-          </a:stretch>
-        </p:blipFill>
-        <p:spPr>
-          <a:xfrm>
-            <a:off x="1399777" y="3024308"/>
-            <a:ext cx="9453406" cy="1666212"/>
-          </a:xfrm>
-          <a:prstGeom prst="rect">
-            <a:avLst/>
-          </a:prstGeom>
-        </p:spPr>
-      </p:pic>
+      <mc:AlternateContent xmlns:mc="http://schemas.openxmlformats.org/markup-compatibility/2006">
+        <mc:Choice xmlns:a14="http://schemas.microsoft.com/office/drawing/2010/main" Requires="a14">
+          <p:sp>
+            <p:nvSpPr>
+              <p:cNvPr id="3" name="내용 개체 틀 2">
+                <a:extLst>
+                  <a:ext uri="{FF2B5EF4-FFF2-40B4-BE49-F238E27FC236}">
+                    <a16:creationId xmlns:a16="http://schemas.microsoft.com/office/drawing/2014/main" id="{12BC1828-6619-4305-8D66-B3B82EC770A8}"/>
+                  </a:ext>
+                </a:extLst>
+              </p:cNvPr>
+              <p:cNvSpPr>
+                <a:spLocks noGrp="1"/>
+              </p:cNvSpPr>
+              <p:nvPr>
+                <p:ph idx="1"/>
+              </p:nvPr>
+            </p:nvSpPr>
+            <p:spPr/>
+            <p:txBody>
+              <a:bodyPr/>
+              <a:lstStyle/>
+              <a:p>
+                <a:r>
+                  <a:rPr lang="ko-KR" altLang="en-US" dirty="0"/>
+                  <a:t>시도 </a:t>
+                </a:r>
+                <a:r>
+                  <a:rPr lang="en-US" altLang="ko-KR" dirty="0"/>
+                  <a:t>2. </a:t>
+                </a:r>
+                <a:r>
+                  <a:rPr lang="ko-KR" altLang="en-US" dirty="0"/>
+                  <a:t>모든 </a:t>
+                </a:r>
+                <a:r>
+                  <a:rPr lang="en-US" altLang="ko-KR" dirty="0"/>
+                  <a:t>data </a:t>
+                </a:r>
+                <a:r>
+                  <a:rPr lang="ko-KR" altLang="en-US" dirty="0"/>
+                  <a:t>분포를 고려해 </a:t>
+                </a:r>
+                <a:r>
+                  <a:rPr lang="en-US" altLang="ko-KR" dirty="0"/>
+                  <a:t>normalization</a:t>
+                </a:r>
+                <a:r>
+                  <a:rPr lang="ko-KR" altLang="en-US" dirty="0"/>
+                  <a:t>을 진행한다</a:t>
+                </a:r>
+                <a:r>
+                  <a:rPr lang="en-US" altLang="ko-KR" dirty="0"/>
+                  <a:t>.</a:t>
+                </a:r>
+              </a:p>
+              <a:p>
+                <a:r>
+                  <a:rPr lang="en-US" altLang="ko-KR" dirty="0"/>
+                  <a:t>(1) normalization </a:t>
+                </a:r>
+                <a:r>
+                  <a:rPr lang="ko-KR" altLang="en-US" dirty="0"/>
+                  <a:t>과정 </a:t>
+                </a:r>
+                <a:r>
+                  <a:rPr lang="en-US" altLang="ko-KR" dirty="0"/>
+                  <a:t>: (X</a:t>
+                </a:r>
+                <a:r>
+                  <a:rPr lang="ko-KR" altLang="en-US" dirty="0"/>
+                  <a:t>는 벡터 형태</a:t>
+                </a:r>
+                <a:r>
+                  <a:rPr lang="en-US" altLang="ko-KR" dirty="0"/>
+                  <a:t>)</a:t>
+                </a:r>
+              </a:p>
+              <a:p>
+                <a14:m>
+                  <m:oMath xmlns:m="http://schemas.openxmlformats.org/officeDocument/2006/math">
+                    <m:acc>
+                      <m:accPr>
+                        <m:chr m:val="̂"/>
+                        <m:ctrlPr>
+                          <a:rPr lang="en-US" altLang="ko-KR" i="1" smtClean="0">
+                            <a:latin typeface="Cambria Math" panose="02040503050406030204" pitchFamily="18" charset="0"/>
+                          </a:rPr>
+                        </m:ctrlPr>
+                      </m:accPr>
+                      <m:e>
+                        <m:r>
+                          <a:rPr lang="en-US" altLang="ko-KR" b="0" i="1" smtClean="0">
+                            <a:latin typeface="Cambria Math" panose="02040503050406030204" pitchFamily="18" charset="0"/>
+                          </a:rPr>
+                          <m:t>𝑋</m:t>
+                        </m:r>
+                      </m:e>
+                    </m:acc>
+                    <m:r>
+                      <a:rPr lang="en-US" altLang="ko-KR" b="0" i="1" smtClean="0">
+                        <a:latin typeface="Cambria Math" panose="02040503050406030204" pitchFamily="18" charset="0"/>
+                      </a:rPr>
+                      <m:t>=</m:t>
+                    </m:r>
+                    <m:sSup>
+                      <m:sSupPr>
+                        <m:ctrlPr>
+                          <a:rPr lang="en-US" altLang="ko-KR" b="0" i="1" smtClean="0">
+                            <a:latin typeface="Cambria Math" panose="02040503050406030204" pitchFamily="18" charset="0"/>
+                          </a:rPr>
+                        </m:ctrlPr>
+                      </m:sSupPr>
+                      <m:e>
+                        <m:r>
+                          <a:rPr lang="en-US" altLang="ko-KR" i="1">
+                            <a:latin typeface="Cambria Math" panose="02040503050406030204" pitchFamily="18" charset="0"/>
+                          </a:rPr>
+                          <m:t>𝐶𝑜𝑣</m:t>
+                        </m:r>
+                        <m:d>
+                          <m:dPr>
+                            <m:ctrlPr>
+                              <a:rPr lang="en-US" altLang="ko-KR" i="1">
+                                <a:latin typeface="Cambria Math" panose="02040503050406030204" pitchFamily="18" charset="0"/>
+                              </a:rPr>
+                            </m:ctrlPr>
+                          </m:dPr>
+                          <m:e>
+                            <m:r>
+                              <a:rPr lang="en-US" altLang="ko-KR" i="1">
+                                <a:latin typeface="Cambria Math" panose="02040503050406030204" pitchFamily="18" charset="0"/>
+                              </a:rPr>
+                              <m:t>𝑋</m:t>
+                            </m:r>
+                          </m:e>
+                        </m:d>
+                      </m:e>
+                      <m:sup>
+                        <m:r>
+                          <a:rPr lang="en-US" altLang="ko-KR" b="0" i="1" smtClean="0">
+                            <a:latin typeface="Cambria Math" panose="02040503050406030204" pitchFamily="18" charset="0"/>
+                          </a:rPr>
+                          <m:t>−</m:t>
+                        </m:r>
+                        <m:f>
+                          <m:fPr>
+                            <m:ctrlPr>
+                              <a:rPr lang="en-US" altLang="ko-KR" b="0" i="1" smtClean="0">
+                                <a:latin typeface="Cambria Math" panose="02040503050406030204" pitchFamily="18" charset="0"/>
+                              </a:rPr>
+                            </m:ctrlPr>
+                          </m:fPr>
+                          <m:num>
+                            <m:r>
+                              <a:rPr lang="en-US" altLang="ko-KR" b="0" i="1" smtClean="0">
+                                <a:latin typeface="Cambria Math" panose="02040503050406030204" pitchFamily="18" charset="0"/>
+                              </a:rPr>
+                              <m:t>1</m:t>
+                            </m:r>
+                          </m:num>
+                          <m:den>
+                            <m:r>
+                              <a:rPr lang="en-US" altLang="ko-KR" b="0" i="1" smtClean="0">
+                                <a:latin typeface="Cambria Math" panose="02040503050406030204" pitchFamily="18" charset="0"/>
+                              </a:rPr>
+                              <m:t>2</m:t>
+                            </m:r>
+                          </m:den>
+                        </m:f>
+                      </m:sup>
+                    </m:sSup>
+                    <m:d>
+                      <m:dPr>
+                        <m:ctrlPr>
+                          <a:rPr lang="en-US" altLang="ko-KR" b="0" i="1" smtClean="0">
+                            <a:latin typeface="Cambria Math" panose="02040503050406030204" pitchFamily="18" charset="0"/>
+                          </a:rPr>
+                        </m:ctrlPr>
+                      </m:dPr>
+                      <m:e>
+                        <m:r>
+                          <a:rPr lang="en-US" altLang="ko-KR" b="0" i="1" smtClean="0">
+                            <a:latin typeface="Cambria Math" panose="02040503050406030204" pitchFamily="18" charset="0"/>
+                          </a:rPr>
+                          <m:t>𝑋</m:t>
+                        </m:r>
+                        <m:r>
+                          <a:rPr lang="en-US" altLang="ko-KR" b="0" i="1" smtClean="0">
+                            <a:latin typeface="Cambria Math" panose="02040503050406030204" pitchFamily="18" charset="0"/>
+                          </a:rPr>
+                          <m:t>−</m:t>
+                        </m:r>
+                        <m:r>
+                          <a:rPr lang="en-US" altLang="ko-KR" b="0" i="1" smtClean="0">
+                            <a:latin typeface="Cambria Math" panose="02040503050406030204" pitchFamily="18" charset="0"/>
+                          </a:rPr>
+                          <m:t>𝐸</m:t>
+                        </m:r>
+                        <m:d>
+                          <m:dPr>
+                            <m:begChr m:val="["/>
+                            <m:endChr m:val="]"/>
+                            <m:ctrlPr>
+                              <a:rPr lang="en-US" altLang="ko-KR" b="0" i="1" smtClean="0">
+                                <a:latin typeface="Cambria Math" panose="02040503050406030204" pitchFamily="18" charset="0"/>
+                              </a:rPr>
+                            </m:ctrlPr>
+                          </m:dPr>
+                          <m:e>
+                            <m:r>
+                              <a:rPr lang="en-US" altLang="ko-KR" b="0" i="1" smtClean="0">
+                                <a:latin typeface="Cambria Math" panose="02040503050406030204" pitchFamily="18" charset="0"/>
+                              </a:rPr>
+                              <m:t>𝑋</m:t>
+                            </m:r>
+                          </m:e>
+                        </m:d>
+                      </m:e>
+                    </m:d>
+                    <m:r>
+                      <a:rPr lang="en-US" altLang="ko-KR" b="0" i="1" smtClean="0">
+                        <a:latin typeface="Cambria Math" panose="02040503050406030204" pitchFamily="18" charset="0"/>
+                      </a:rPr>
+                      <m:t>, </m:t>
+                    </m:r>
+                    <m:r>
+                      <a:rPr lang="en-US" altLang="ko-KR" b="0" i="1" smtClean="0">
+                        <a:latin typeface="Cambria Math" panose="02040503050406030204" pitchFamily="18" charset="0"/>
+                      </a:rPr>
+                      <m:t>𝐶𝑜𝑣</m:t>
+                    </m:r>
+                    <m:d>
+                      <m:dPr>
+                        <m:ctrlPr>
+                          <a:rPr lang="en-US" altLang="ko-KR" b="0" i="1" smtClean="0">
+                            <a:latin typeface="Cambria Math" panose="02040503050406030204" pitchFamily="18" charset="0"/>
+                          </a:rPr>
+                        </m:ctrlPr>
+                      </m:dPr>
+                      <m:e>
+                        <m:r>
+                          <a:rPr lang="en-US" altLang="ko-KR" b="0" i="1" smtClean="0">
+                            <a:latin typeface="Cambria Math" panose="02040503050406030204" pitchFamily="18" charset="0"/>
+                          </a:rPr>
+                          <m:t>𝑋</m:t>
+                        </m:r>
+                      </m:e>
+                    </m:d>
+                    <m:r>
+                      <a:rPr lang="en-US" altLang="ko-KR" b="0" i="1" smtClean="0">
+                        <a:latin typeface="Cambria Math" panose="02040503050406030204" pitchFamily="18" charset="0"/>
+                      </a:rPr>
+                      <m:t>=</m:t>
+                    </m:r>
+                    <m:r>
+                      <a:rPr lang="en-US" altLang="ko-KR" b="0" i="1" smtClean="0">
+                        <a:latin typeface="Cambria Math" panose="02040503050406030204" pitchFamily="18" charset="0"/>
+                      </a:rPr>
+                      <m:t>𝐸</m:t>
+                    </m:r>
+                    <m:r>
+                      <a:rPr lang="en-US" altLang="ko-KR" b="0" i="1" smtClean="0">
+                        <a:latin typeface="Cambria Math" panose="02040503050406030204" pitchFamily="18" charset="0"/>
+                      </a:rPr>
+                      <m:t>[</m:t>
+                    </m:r>
+                    <m:d>
+                      <m:dPr>
+                        <m:ctrlPr>
+                          <a:rPr lang="en-US" altLang="ko-KR" b="0" i="1" smtClean="0">
+                            <a:latin typeface="Cambria Math" panose="02040503050406030204" pitchFamily="18" charset="0"/>
+                          </a:rPr>
+                        </m:ctrlPr>
+                      </m:dPr>
+                      <m:e>
+                        <m:r>
+                          <a:rPr lang="en-US" altLang="ko-KR" b="0" i="1" smtClean="0">
+                            <a:latin typeface="Cambria Math" panose="02040503050406030204" pitchFamily="18" charset="0"/>
+                          </a:rPr>
+                          <m:t>𝑋</m:t>
+                        </m:r>
+                        <m:r>
+                          <a:rPr lang="en-US" altLang="ko-KR" b="0" i="1" smtClean="0">
+                            <a:latin typeface="Cambria Math" panose="02040503050406030204" pitchFamily="18" charset="0"/>
+                          </a:rPr>
+                          <m:t>−</m:t>
+                        </m:r>
+                        <m:r>
+                          <a:rPr lang="en-US" altLang="ko-KR" b="0" i="1" smtClean="0">
+                            <a:latin typeface="Cambria Math" panose="02040503050406030204" pitchFamily="18" charset="0"/>
+                          </a:rPr>
+                          <m:t>𝐸</m:t>
+                        </m:r>
+                        <m:d>
+                          <m:dPr>
+                            <m:begChr m:val="["/>
+                            <m:endChr m:val="]"/>
+                            <m:ctrlPr>
+                              <a:rPr lang="en-US" altLang="ko-KR" b="0" i="1" smtClean="0">
+                                <a:latin typeface="Cambria Math" panose="02040503050406030204" pitchFamily="18" charset="0"/>
+                              </a:rPr>
+                            </m:ctrlPr>
+                          </m:dPr>
+                          <m:e>
+                            <m:r>
+                              <a:rPr lang="en-US" altLang="ko-KR" b="0" i="1" smtClean="0">
+                                <a:latin typeface="Cambria Math" panose="02040503050406030204" pitchFamily="18" charset="0"/>
+                              </a:rPr>
+                              <m:t>𝑋</m:t>
+                            </m:r>
+                          </m:e>
+                        </m:d>
+                      </m:e>
+                    </m:d>
+                    <m:sSup>
+                      <m:sSupPr>
+                        <m:ctrlPr>
+                          <a:rPr lang="en-US" altLang="ko-KR" b="0" i="1" smtClean="0">
+                            <a:latin typeface="Cambria Math" panose="02040503050406030204" pitchFamily="18" charset="0"/>
+                          </a:rPr>
+                        </m:ctrlPr>
+                      </m:sSupPr>
+                      <m:e>
+                        <m:d>
+                          <m:dPr>
+                            <m:ctrlPr>
+                              <a:rPr lang="en-US" altLang="ko-KR" i="1">
+                                <a:latin typeface="Cambria Math" panose="02040503050406030204" pitchFamily="18" charset="0"/>
+                              </a:rPr>
+                            </m:ctrlPr>
+                          </m:dPr>
+                          <m:e>
+                            <m:r>
+                              <a:rPr lang="en-US" altLang="ko-KR" i="1">
+                                <a:latin typeface="Cambria Math" panose="02040503050406030204" pitchFamily="18" charset="0"/>
+                              </a:rPr>
+                              <m:t>𝑋</m:t>
+                            </m:r>
+                            <m:r>
+                              <a:rPr lang="en-US" altLang="ko-KR" i="1">
+                                <a:latin typeface="Cambria Math" panose="02040503050406030204" pitchFamily="18" charset="0"/>
+                              </a:rPr>
+                              <m:t>−</m:t>
+                            </m:r>
+                            <m:r>
+                              <a:rPr lang="en-US" altLang="ko-KR" i="1">
+                                <a:latin typeface="Cambria Math" panose="02040503050406030204" pitchFamily="18" charset="0"/>
+                              </a:rPr>
+                              <m:t>𝐸</m:t>
+                            </m:r>
+                            <m:d>
+                              <m:dPr>
+                                <m:begChr m:val="["/>
+                                <m:endChr m:val="]"/>
+                                <m:ctrlPr>
+                                  <a:rPr lang="en-US" altLang="ko-KR" i="1">
+                                    <a:latin typeface="Cambria Math" panose="02040503050406030204" pitchFamily="18" charset="0"/>
+                                  </a:rPr>
+                                </m:ctrlPr>
+                              </m:dPr>
+                              <m:e>
+                                <m:r>
+                                  <a:rPr lang="en-US" altLang="ko-KR" i="1">
+                                    <a:latin typeface="Cambria Math" panose="02040503050406030204" pitchFamily="18" charset="0"/>
+                                  </a:rPr>
+                                  <m:t>𝑋</m:t>
+                                </m:r>
+                              </m:e>
+                            </m:d>
+                          </m:e>
+                        </m:d>
+                      </m:e>
+                      <m:sup>
+                        <m:r>
+                          <a:rPr lang="en-US" altLang="ko-KR" b="0" i="1" smtClean="0">
+                            <a:latin typeface="Cambria Math" panose="02040503050406030204" pitchFamily="18" charset="0"/>
+                          </a:rPr>
+                          <m:t>𝑇</m:t>
+                        </m:r>
+                      </m:sup>
+                    </m:sSup>
+                    <m:r>
+                      <a:rPr lang="en-US" altLang="ko-KR" b="0" i="1" smtClean="0">
+                        <a:latin typeface="Cambria Math" panose="02040503050406030204" pitchFamily="18" charset="0"/>
+                      </a:rPr>
+                      <m:t>]</m:t>
+                    </m:r>
+                  </m:oMath>
+                </a14:m>
+                <a:endParaRPr lang="en-US" altLang="ko-KR" dirty="0"/>
+              </a:p>
+              <a:p>
+                <a:r>
+                  <a:rPr lang="en-US" altLang="ko-KR" dirty="0"/>
+                  <a:t>(2) optimization :</a:t>
+                </a:r>
+              </a:p>
+              <a:p>
+                <a14:m>
+                  <m:oMath xmlns:m="http://schemas.openxmlformats.org/officeDocument/2006/math">
+                    <m:f>
+                      <m:fPr>
+                        <m:ctrlPr>
+                          <a:rPr lang="en-US" altLang="ko-KR" i="1">
+                            <a:latin typeface="Cambria Math" panose="02040503050406030204" pitchFamily="18" charset="0"/>
+                          </a:rPr>
+                        </m:ctrlPr>
+                      </m:fPr>
+                      <m:num>
+                        <m:r>
+                          <a:rPr lang="ko-KR" altLang="en-US" i="1">
+                            <a:latin typeface="Cambria Math" panose="02040503050406030204" pitchFamily="18" charset="0"/>
+                          </a:rPr>
+                          <m:t>𝜕</m:t>
+                        </m:r>
+                        <m:r>
+                          <a:rPr lang="en-US" altLang="ko-KR" i="1">
+                            <a:latin typeface="Cambria Math" panose="02040503050406030204" pitchFamily="18" charset="0"/>
+                          </a:rPr>
+                          <m:t>𝐿𝑜𝑠𝑠</m:t>
+                        </m:r>
+                      </m:num>
+                      <m:den>
+                        <m:r>
+                          <a:rPr lang="ko-KR" altLang="en-US" i="1">
+                            <a:latin typeface="Cambria Math" panose="02040503050406030204" pitchFamily="18" charset="0"/>
+                          </a:rPr>
+                          <m:t>𝜕</m:t>
+                        </m:r>
+                        <m:r>
+                          <a:rPr lang="en-US" altLang="ko-KR" i="1">
+                            <a:latin typeface="Cambria Math" panose="02040503050406030204" pitchFamily="18" charset="0"/>
+                          </a:rPr>
+                          <m:t>𝐸</m:t>
+                        </m:r>
+                        <m:d>
+                          <m:dPr>
+                            <m:begChr m:val="["/>
+                            <m:endChr m:val="]"/>
+                            <m:ctrlPr>
+                              <a:rPr lang="en-US" altLang="ko-KR" i="1">
+                                <a:latin typeface="Cambria Math" panose="02040503050406030204" pitchFamily="18" charset="0"/>
+                              </a:rPr>
+                            </m:ctrlPr>
+                          </m:dPr>
+                          <m:e>
+                            <m:r>
+                              <a:rPr lang="en-US" altLang="ko-KR" b="0" i="1" smtClean="0">
+                                <a:latin typeface="Cambria Math" panose="02040503050406030204" pitchFamily="18" charset="0"/>
+                              </a:rPr>
+                              <m:t>𝑋</m:t>
+                            </m:r>
+                          </m:e>
+                        </m:d>
+                      </m:den>
+                    </m:f>
+                    <m:r>
+                      <a:rPr lang="en-US" altLang="ko-KR" b="0" i="1" smtClean="0">
+                        <a:latin typeface="Cambria Math" panose="02040503050406030204" pitchFamily="18" charset="0"/>
+                      </a:rPr>
+                      <m:t>,</m:t>
+                    </m:r>
+                    <m:f>
+                      <m:fPr>
+                        <m:ctrlPr>
+                          <a:rPr lang="en-US" altLang="ko-KR" i="1">
+                            <a:latin typeface="Cambria Math" panose="02040503050406030204" pitchFamily="18" charset="0"/>
+                          </a:rPr>
+                        </m:ctrlPr>
+                      </m:fPr>
+                      <m:num>
+                        <m:r>
+                          <a:rPr lang="ko-KR" altLang="en-US" i="1">
+                            <a:latin typeface="Cambria Math" panose="02040503050406030204" pitchFamily="18" charset="0"/>
+                          </a:rPr>
+                          <m:t>𝜕</m:t>
+                        </m:r>
+                        <m:r>
+                          <a:rPr lang="en-US" altLang="ko-KR" i="1">
+                            <a:latin typeface="Cambria Math" panose="02040503050406030204" pitchFamily="18" charset="0"/>
+                          </a:rPr>
+                          <m:t>𝐿𝑜𝑠𝑠</m:t>
+                        </m:r>
+                      </m:num>
+                      <m:den>
+                        <m:r>
+                          <a:rPr lang="ko-KR" altLang="en-US" i="1">
+                            <a:latin typeface="Cambria Math" panose="02040503050406030204" pitchFamily="18" charset="0"/>
+                          </a:rPr>
+                          <m:t>𝜕</m:t>
+                        </m:r>
+                        <m:r>
+                          <a:rPr lang="en-US" altLang="ko-KR" b="0" i="1" smtClean="0">
+                            <a:latin typeface="Cambria Math" panose="02040503050406030204" pitchFamily="18" charset="0"/>
+                          </a:rPr>
+                          <m:t>𝐶𝑜𝑣</m:t>
+                        </m:r>
+                        <m:r>
+                          <a:rPr lang="en-US" altLang="ko-KR" b="0" i="1" smtClean="0">
+                            <a:latin typeface="Cambria Math" panose="02040503050406030204" pitchFamily="18" charset="0"/>
+                          </a:rPr>
+                          <m:t>(</m:t>
+                        </m:r>
+                        <m:r>
+                          <a:rPr lang="en-US" altLang="ko-KR" b="0" i="1" smtClean="0">
+                            <a:latin typeface="Cambria Math" panose="02040503050406030204" pitchFamily="18" charset="0"/>
+                          </a:rPr>
+                          <m:t>𝑋</m:t>
+                        </m:r>
+                        <m:r>
+                          <a:rPr lang="en-US" altLang="ko-KR" b="0" i="1" smtClean="0">
+                            <a:latin typeface="Cambria Math" panose="02040503050406030204" pitchFamily="18" charset="0"/>
+                          </a:rPr>
+                          <m:t>)</m:t>
+                        </m:r>
+                      </m:den>
+                    </m:f>
+                  </m:oMath>
+                </a14:m>
+                <a:r>
+                  <a:rPr lang="en-US" altLang="ko-KR" dirty="0"/>
+                  <a:t> </a:t>
+                </a:r>
+              </a:p>
+              <a:p>
+                <a:endParaRPr lang="en-US" altLang="ko-KR" dirty="0"/>
+              </a:p>
+              <a:p>
+                <a:r>
+                  <a:rPr lang="en-US" altLang="ko-KR" dirty="0"/>
+                  <a:t>-&gt; </a:t>
+                </a:r>
+                <a:r>
+                  <a:rPr lang="ko-KR" altLang="en-US" dirty="0" err="1"/>
+                  <a:t>계산량이</a:t>
+                </a:r>
+                <a:r>
+                  <a:rPr lang="ko-KR" altLang="en-US" dirty="0"/>
+                  <a:t> 너무 많다</a:t>
+                </a:r>
+                <a:r>
+                  <a:rPr lang="en-US" altLang="ko-KR" dirty="0"/>
+                  <a:t>.</a:t>
+                </a:r>
+              </a:p>
+              <a:p>
+                <a:endParaRPr lang="en-US" altLang="ko-KR" dirty="0"/>
+              </a:p>
+              <a:p>
+                <a:endParaRPr lang="en-US" altLang="ko-KR" dirty="0"/>
+              </a:p>
+              <a:p>
+                <a:endParaRPr lang="en-US" altLang="ko-KR" dirty="0"/>
+              </a:p>
+              <a:p>
+                <a:endParaRPr lang="ko-KR" altLang="en-US" dirty="0"/>
+              </a:p>
+            </p:txBody>
+          </p:sp>
+        </mc:Choice>
+        <mc:Fallback>
+          <p:sp>
+            <p:nvSpPr>
+              <p:cNvPr id="3" name="내용 개체 틀 2">
+                <a:extLst>
+                  <a:ext uri="{FF2B5EF4-FFF2-40B4-BE49-F238E27FC236}">
+                    <a16:creationId xmlns:a16="http://schemas.microsoft.com/office/drawing/2014/main" id="{12BC1828-6619-4305-8D66-B3B82EC770A8}"/>
+                  </a:ext>
+                </a:extLst>
+              </p:cNvPr>
+              <p:cNvSpPr>
+                <a:spLocks noGrp="1" noRot="1" noChangeAspect="1" noMove="1" noResize="1" noEditPoints="1" noAdjustHandles="1" noChangeArrowheads="1" noChangeShapeType="1" noTextEdit="1"/>
+              </p:cNvSpPr>
+              <p:nvPr>
+                <p:ph idx="1"/>
+              </p:nvPr>
+            </p:nvSpPr>
+            <p:spPr>
+              <a:blipFill>
+                <a:blip r:embed="rId2"/>
+                <a:stretch>
+                  <a:fillRect l="-606" t="-1970"/>
+                </a:stretch>
+              </a:blipFill>
+            </p:spPr>
+            <p:txBody>
+              <a:bodyPr/>
+              <a:lstStyle/>
+              <a:p>
+                <a:r>
+                  <a:rPr lang="ko-KR" altLang="en-US">
+                    <a:noFill/>
+                  </a:rPr>
+                  <a:t> </a:t>
+                </a:r>
+              </a:p>
+            </p:txBody>
+          </p:sp>
+        </mc:Fallback>
+      </mc:AlternateContent>
     </p:spTree>
     <p:extLst>
       <p:ext uri="{BB962C8B-B14F-4D97-AF65-F5344CB8AC3E}">
@@ -5243,7 +5903,7 @@
           <p:cNvPr id="2" name="제목 1">
             <a:extLst>
               <a:ext uri="{FF2B5EF4-FFF2-40B4-BE49-F238E27FC236}">
-                <a16:creationId xmlns:a16="http://schemas.microsoft.com/office/drawing/2014/main" id="{B1C9E45A-F5EA-440A-A9AC-81A8CFA4F565}"/>
+                <a16:creationId xmlns:a16="http://schemas.microsoft.com/office/drawing/2014/main" id="{C1C9D771-D998-4467-9C8A-2CF07AB9F0F6}"/>
               </a:ext>
             </a:extLst>
           </p:cNvPr>
@@ -5267,164 +5927,113 @@
           </a:p>
         </p:txBody>
       </p:sp>
-      <p:sp>
-        <p:nvSpPr>
-          <p:cNvPr id="3" name="내용 개체 틀 2">
+      <p:pic>
+        <p:nvPicPr>
+          <p:cNvPr id="9" name="그림 8">
             <a:extLst>
               <a:ext uri="{FF2B5EF4-FFF2-40B4-BE49-F238E27FC236}">
-                <a16:creationId xmlns:a16="http://schemas.microsoft.com/office/drawing/2014/main" id="{12BC1828-6619-4305-8D66-B3B82EC770A8}"/>
+                <a16:creationId xmlns:a16="http://schemas.microsoft.com/office/drawing/2014/main" id="{DF982A02-E9FA-43DD-9B9D-E3E5982E601B}"/>
               </a:ext>
             </a:extLst>
           </p:cNvPr>
-          <p:cNvSpPr>
-            <a:spLocks noGrp="1"/>
-          </p:cNvSpPr>
+          <p:cNvPicPr>
+            <a:picLocks noChangeAspect="1"/>
+          </p:cNvPicPr>
+          <p:nvPr/>
+        </p:nvPicPr>
+        <p:blipFill>
+          <a:blip r:embed="rId2"/>
+          <a:stretch>
+            <a:fillRect/>
+          </a:stretch>
+        </p:blipFill>
+        <p:spPr>
+          <a:xfrm>
+            <a:off x="8081567" y="1893039"/>
+            <a:ext cx="3074113" cy="1658235"/>
+          </a:xfrm>
+          <a:prstGeom prst="rect">
+            <a:avLst/>
+          </a:prstGeom>
+        </p:spPr>
+      </p:pic>
+      <p:sp>
+        <p:nvSpPr>
+          <p:cNvPr id="10" name="TextBox 9">
+            <a:extLst>
+              <a:ext uri="{FF2B5EF4-FFF2-40B4-BE49-F238E27FC236}">
+                <a16:creationId xmlns:a16="http://schemas.microsoft.com/office/drawing/2014/main" id="{425E3C41-AF02-4C44-ABE2-04BBE6AA8EAB}"/>
+              </a:ext>
+            </a:extLst>
+          </p:cNvPr>
+          <p:cNvSpPr txBox="1"/>
+          <p:nvPr/>
+        </p:nvSpPr>
+        <p:spPr>
+          <a:xfrm>
+            <a:off x="1097280" y="1737360"/>
+            <a:ext cx="5813883" cy="369332"/>
+          </a:xfrm>
+          <a:prstGeom prst="rect">
+            <a:avLst/>
+          </a:prstGeom>
+          <a:noFill/>
+        </p:spPr>
+        <p:txBody>
+          <a:bodyPr wrap="square" rtlCol="0">
+            <a:spAutoFit/>
+          </a:bodyPr>
+          <a:lstStyle/>
+          <a:p>
+            <a:r>
+              <a:rPr lang="en-US" altLang="ko-KR" dirty="0"/>
+              <a:t>Optimization </a:t>
+            </a:r>
+            <a:r>
+              <a:rPr lang="ko-KR" altLang="en-US" dirty="0"/>
+              <a:t>과정 </a:t>
+            </a:r>
+            <a:r>
+              <a:rPr lang="en-US" altLang="ko-KR" dirty="0"/>
+              <a:t>:</a:t>
+            </a:r>
+            <a:endParaRPr lang="ko-KR" altLang="en-US" dirty="0"/>
+          </a:p>
+        </p:txBody>
+      </p:sp>
+      <p:pic>
+        <p:nvPicPr>
+          <p:cNvPr id="14" name="내용 개체 틀 13">
+            <a:extLst>
+              <a:ext uri="{FF2B5EF4-FFF2-40B4-BE49-F238E27FC236}">
+                <a16:creationId xmlns:a16="http://schemas.microsoft.com/office/drawing/2014/main" id="{3F945E43-7DBB-44F9-827C-8A43728C7452}"/>
+              </a:ext>
+            </a:extLst>
+          </p:cNvPr>
+          <p:cNvPicPr>
+            <a:picLocks noGrp="1" noChangeAspect="1"/>
+          </p:cNvPicPr>
           <p:nvPr>
             <p:ph idx="1"/>
           </p:nvPr>
-        </p:nvSpPr>
-        <p:spPr/>
-        <p:txBody>
-          <a:bodyPr/>
-          <a:lstStyle/>
-          <a:p>
-            <a:r>
-              <a:rPr lang="en-US" altLang="ko-KR" dirty="0"/>
-              <a:t>BN</a:t>
-            </a:r>
-            <a:r>
-              <a:rPr lang="ko-KR" altLang="en-US" dirty="0"/>
-              <a:t> </a:t>
-            </a:r>
-            <a:r>
-              <a:rPr lang="en-US" altLang="ko-KR" dirty="0"/>
-              <a:t>on</a:t>
-            </a:r>
-            <a:r>
-              <a:rPr lang="ko-KR" altLang="en-US" dirty="0"/>
-              <a:t> </a:t>
-            </a:r>
-            <a:r>
-              <a:rPr lang="en-US" altLang="ko-KR" dirty="0"/>
-              <a:t>CNN</a:t>
-            </a:r>
-          </a:p>
-          <a:p>
-            <a:endParaRPr lang="en-US" altLang="ko-KR" dirty="0"/>
-          </a:p>
-          <a:p>
-            <a:r>
-              <a:rPr lang="ko-KR" altLang="en-US" dirty="0"/>
-              <a:t>평균과 분산은 </a:t>
-            </a:r>
-            <a:r>
-              <a:rPr lang="en-US" altLang="ko-KR" dirty="0"/>
-              <a:t>feature map * mini-batch = m(mini-batch)</a:t>
-            </a:r>
-            <a:r>
-              <a:rPr lang="ko-KR" altLang="en-US" dirty="0"/>
-              <a:t> </a:t>
-            </a:r>
-            <a:r>
-              <a:rPr lang="en-US" altLang="ko-KR" dirty="0"/>
-              <a:t>*</a:t>
-            </a:r>
-            <a:r>
-              <a:rPr lang="ko-KR" altLang="en-US" dirty="0"/>
-              <a:t> </a:t>
-            </a:r>
-            <a:r>
-              <a:rPr lang="en-US" altLang="ko-KR" dirty="0"/>
-              <a:t>w(weight)</a:t>
-            </a:r>
-            <a:r>
-              <a:rPr lang="ko-KR" altLang="en-US" dirty="0"/>
-              <a:t> </a:t>
-            </a:r>
-            <a:r>
-              <a:rPr lang="en-US" altLang="ko-KR" dirty="0"/>
-              <a:t>*</a:t>
-            </a:r>
-            <a:r>
-              <a:rPr lang="ko-KR" altLang="en-US" dirty="0"/>
-              <a:t> </a:t>
-            </a:r>
-            <a:r>
-              <a:rPr lang="en-US" altLang="ko-KR" dirty="0"/>
-              <a:t>h(height)</a:t>
-            </a:r>
-            <a:r>
-              <a:rPr lang="ko-KR" altLang="en-US" dirty="0"/>
-              <a:t> 만큼의 </a:t>
-            </a:r>
-            <a:r>
-              <a:rPr lang="en-US" altLang="ko-KR" dirty="0"/>
-              <a:t>elements</a:t>
-            </a:r>
-            <a:r>
-              <a:rPr lang="ko-KR" altLang="en-US" dirty="0"/>
-              <a:t>를 이용해 구한다</a:t>
-            </a:r>
-            <a:r>
-              <a:rPr lang="en-US" altLang="ko-KR" dirty="0"/>
-              <a:t>.</a:t>
-            </a:r>
-          </a:p>
-          <a:p>
-            <a:r>
-              <a:rPr lang="el-GR" altLang="ko-KR" dirty="0">
-                <a:ea typeface="맑은 고딕" panose="020B0503020000020004" pitchFamily="50" charset="-127"/>
-              </a:rPr>
-              <a:t>Γ</a:t>
-            </a:r>
-            <a:r>
-              <a:rPr lang="en-US" altLang="ko-KR" dirty="0">
-                <a:ea typeface="맑은 고딕" panose="020B0503020000020004" pitchFamily="50" charset="-127"/>
-              </a:rPr>
-              <a:t>,</a:t>
-            </a:r>
-            <a:r>
-              <a:rPr lang="ko-KR" altLang="en-US" dirty="0">
-                <a:ea typeface="맑은 고딕" panose="020B0503020000020004" pitchFamily="50" charset="-127"/>
-              </a:rPr>
-              <a:t> </a:t>
-            </a:r>
-            <a:r>
-              <a:rPr lang="el-GR" altLang="ko-KR" dirty="0">
-                <a:ea typeface="맑은 고딕" panose="020B0503020000020004" pitchFamily="50" charset="-127"/>
-              </a:rPr>
-              <a:t>β</a:t>
-            </a:r>
-            <a:r>
-              <a:rPr lang="ko-KR" altLang="en-US" dirty="0">
-                <a:ea typeface="맑은 고딕" panose="020B0503020000020004" pitchFamily="50" charset="-127"/>
-              </a:rPr>
-              <a:t>는 </a:t>
-            </a:r>
-            <a:r>
-              <a:rPr lang="ko-KR" altLang="en-US" dirty="0"/>
-              <a:t>각각의 </a:t>
-            </a:r>
-            <a:r>
-              <a:rPr lang="en-US" altLang="ko-KR" dirty="0"/>
-              <a:t>feature-map</a:t>
-            </a:r>
-            <a:r>
-              <a:rPr lang="ko-KR" altLang="en-US" dirty="0"/>
-              <a:t>에 적용한다</a:t>
-            </a:r>
-            <a:r>
-              <a:rPr lang="en-US" altLang="ko-KR" dirty="0"/>
-              <a:t>.</a:t>
-            </a:r>
-            <a:endParaRPr lang="ko-KR" altLang="en-US" dirty="0"/>
-          </a:p>
-        </p:txBody>
-      </p:sp>
+        </p:nvPicPr>
+        <p:blipFill>
+          <a:blip r:embed="rId3"/>
+          <a:stretch>
+            <a:fillRect/>
+          </a:stretch>
+        </p:blipFill>
+        <p:spPr>
+          <a:xfrm>
+            <a:off x="1097280" y="2339340"/>
+            <a:ext cx="7038748" cy="3875929"/>
+          </a:xfrm>
+        </p:spPr>
+      </p:pic>
     </p:spTree>
     <p:extLst>
       <p:ext uri="{BB962C8B-B14F-4D97-AF65-F5344CB8AC3E}">
-        <p14:creationId xmlns:p14="http://schemas.microsoft.com/office/powerpoint/2010/main" val="1670047476"/>
+        <p14:creationId xmlns:p14="http://schemas.microsoft.com/office/powerpoint/2010/main" val="1691625787"/>
       </p:ext>
     </p:extLst>
   </p:cSld>
@@ -5456,7 +6065,7 @@
           <p:cNvPr id="2" name="제목 1">
             <a:extLst>
               <a:ext uri="{FF2B5EF4-FFF2-40B4-BE49-F238E27FC236}">
-                <a16:creationId xmlns:a16="http://schemas.microsoft.com/office/drawing/2014/main" id="{B1C9E45A-F5EA-440A-A9AC-81A8CFA4F565}"/>
+                <a16:creationId xmlns:a16="http://schemas.microsoft.com/office/drawing/2014/main" id="{59F9D14C-CB87-47F1-B418-79EC043F3711}"/>
               </a:ext>
             </a:extLst>
           </p:cNvPr>
@@ -5480,93 +6089,723 @@
           </a:p>
         </p:txBody>
       </p:sp>
-      <p:sp>
-        <p:nvSpPr>
-          <p:cNvPr id="3" name="내용 개체 틀 2">
+      <mc:AlternateContent xmlns:mc="http://schemas.openxmlformats.org/markup-compatibility/2006">
+        <mc:Choice xmlns:a14="http://schemas.microsoft.com/office/drawing/2010/main" Requires="a14">
+          <p:sp>
+            <p:nvSpPr>
+              <p:cNvPr id="3" name="내용 개체 틀 2">
+                <a:extLst>
+                  <a:ext uri="{FF2B5EF4-FFF2-40B4-BE49-F238E27FC236}">
+                    <a16:creationId xmlns:a16="http://schemas.microsoft.com/office/drawing/2014/main" id="{584DBC28-F541-4D5A-92A9-8F87F5EEE9EA}"/>
+                  </a:ext>
+                </a:extLst>
+              </p:cNvPr>
+              <p:cNvSpPr>
+                <a:spLocks noGrp="1"/>
+              </p:cNvSpPr>
+              <p:nvPr>
+                <p:ph idx="1"/>
+              </p:nvPr>
+            </p:nvSpPr>
+            <p:spPr/>
+            <p:txBody>
+              <a:bodyPr/>
+              <a:lstStyle/>
+              <a:p>
+                <a:r>
+                  <a:rPr lang="en-US" altLang="ko-KR" dirty="0"/>
+                  <a:t>W </a:t>
+                </a:r>
+                <a:r>
+                  <a:rPr lang="ko-KR" altLang="en-US" dirty="0"/>
+                  <a:t>학습 과정 비교</a:t>
+                </a:r>
+                <a:endParaRPr lang="en-US" altLang="ko-KR" dirty="0"/>
+              </a:p>
+              <a:p>
+                <a:r>
+                  <a:rPr lang="ko-KR" altLang="en-US" dirty="0"/>
+                  <a:t>기존 과정 </a:t>
+                </a:r>
+                <a:r>
+                  <a:rPr lang="en-US" altLang="ko-KR" dirty="0"/>
+                  <a:t>: </a:t>
+                </a:r>
+              </a:p>
+              <a:p>
+                <a:r>
+                  <a:rPr lang="en-US" altLang="ko-KR" dirty="0"/>
+                  <a:t>O2 = act2(I2 = </a:t>
+                </a:r>
+                <a:r>
+                  <a:rPr lang="el-GR" altLang="ko-KR" dirty="0">
+                    <a:ea typeface="맑은 고딕" panose="020B0503020000020004" pitchFamily="50" charset="-127"/>
+                  </a:rPr>
+                  <a:t>Σ</a:t>
+                </a:r>
+                <a:r>
+                  <a:rPr lang="en-US" altLang="ko-KR" dirty="0"/>
+                  <a:t>W2*O1+B2)</a:t>
+                </a:r>
+              </a:p>
+              <a:p>
+                <a14:m>
+                  <m:oMath xmlns:m="http://schemas.openxmlformats.org/officeDocument/2006/math">
+                    <m:f>
+                      <m:fPr>
+                        <m:ctrlPr>
+                          <a:rPr lang="en-US" altLang="ko-KR" i="1">
+                            <a:latin typeface="Cambria Math" panose="02040503050406030204" pitchFamily="18" charset="0"/>
+                          </a:rPr>
+                        </m:ctrlPr>
+                      </m:fPr>
+                      <m:num>
+                        <m:r>
+                          <a:rPr lang="ko-KR" altLang="en-US" i="1">
+                            <a:latin typeface="Cambria Math" panose="02040503050406030204" pitchFamily="18" charset="0"/>
+                          </a:rPr>
+                          <m:t>𝜕</m:t>
+                        </m:r>
+                        <m:r>
+                          <a:rPr lang="en-US" altLang="ko-KR" i="1">
+                            <a:latin typeface="Cambria Math" panose="02040503050406030204" pitchFamily="18" charset="0"/>
+                          </a:rPr>
+                          <m:t>𝐿𝑜𝑠𝑠</m:t>
+                        </m:r>
+                      </m:num>
+                      <m:den>
+                        <m:r>
+                          <a:rPr lang="ko-KR" altLang="en-US" i="1">
+                            <a:latin typeface="Cambria Math" panose="02040503050406030204" pitchFamily="18" charset="0"/>
+                          </a:rPr>
+                          <m:t>𝜕</m:t>
+                        </m:r>
+                        <m:r>
+                          <a:rPr lang="en-US" altLang="ko-KR" b="0" i="1" smtClean="0">
+                            <a:latin typeface="Cambria Math" panose="02040503050406030204" pitchFamily="18" charset="0"/>
+                          </a:rPr>
+                          <m:t>𝑊</m:t>
+                        </m:r>
+                        <m:r>
+                          <a:rPr lang="en-US" altLang="ko-KR" b="0" i="1" smtClean="0">
+                            <a:latin typeface="Cambria Math" panose="02040503050406030204" pitchFamily="18" charset="0"/>
+                          </a:rPr>
+                          <m:t>2</m:t>
+                        </m:r>
+                      </m:den>
+                    </m:f>
+                    <m:r>
+                      <a:rPr lang="en-US" altLang="ko-KR" b="0" i="1" smtClean="0">
+                        <a:latin typeface="Cambria Math" panose="02040503050406030204" pitchFamily="18" charset="0"/>
+                      </a:rPr>
+                      <m:t>=</m:t>
+                    </m:r>
+                    <m:f>
+                      <m:fPr>
+                        <m:ctrlPr>
+                          <a:rPr lang="en-US" altLang="ko-KR" i="1" smtClean="0">
+                            <a:latin typeface="Cambria Math" panose="02040503050406030204" pitchFamily="18" charset="0"/>
+                          </a:rPr>
+                        </m:ctrlPr>
+                      </m:fPr>
+                      <m:num>
+                        <m:r>
+                          <a:rPr lang="ko-KR" altLang="en-US" i="1" smtClean="0">
+                            <a:latin typeface="Cambria Math" panose="02040503050406030204" pitchFamily="18" charset="0"/>
+                          </a:rPr>
+                          <m:t>𝜕</m:t>
+                        </m:r>
+                        <m:r>
+                          <a:rPr lang="en-US" altLang="ko-KR" b="0" i="1" smtClean="0">
+                            <a:latin typeface="Cambria Math" panose="02040503050406030204" pitchFamily="18" charset="0"/>
+                          </a:rPr>
+                          <m:t>𝐿𝑜𝑠𝑠</m:t>
+                        </m:r>
+                      </m:num>
+                      <m:den>
+                        <m:r>
+                          <a:rPr lang="ko-KR" altLang="en-US" i="1" smtClean="0">
+                            <a:latin typeface="Cambria Math" panose="02040503050406030204" pitchFamily="18" charset="0"/>
+                          </a:rPr>
+                          <m:t>𝜕</m:t>
+                        </m:r>
+                        <m:r>
+                          <a:rPr lang="en-US" altLang="ko-KR" b="0" i="1" smtClean="0">
+                            <a:latin typeface="Cambria Math" panose="02040503050406030204" pitchFamily="18" charset="0"/>
+                          </a:rPr>
+                          <m:t>𝑂</m:t>
+                        </m:r>
+                        <m:r>
+                          <a:rPr lang="en-US" altLang="ko-KR" b="0" i="1" smtClean="0">
+                            <a:latin typeface="Cambria Math" panose="02040503050406030204" pitchFamily="18" charset="0"/>
+                          </a:rPr>
+                          <m:t>2</m:t>
+                        </m:r>
+                      </m:den>
+                    </m:f>
+                    <m:f>
+                      <m:fPr>
+                        <m:ctrlPr>
+                          <a:rPr lang="en-US" altLang="ko-KR" i="1" smtClean="0">
+                            <a:solidFill>
+                              <a:srgbClr val="FF0000"/>
+                            </a:solidFill>
+                            <a:latin typeface="Cambria Math" panose="02040503050406030204" pitchFamily="18" charset="0"/>
+                          </a:rPr>
+                        </m:ctrlPr>
+                      </m:fPr>
+                      <m:num>
+                        <m:r>
+                          <a:rPr lang="ko-KR" altLang="en-US" i="1" smtClean="0">
+                            <a:solidFill>
+                              <a:srgbClr val="FF0000"/>
+                            </a:solidFill>
+                            <a:latin typeface="Cambria Math" panose="02040503050406030204" pitchFamily="18" charset="0"/>
+                          </a:rPr>
+                          <m:t>𝜕</m:t>
+                        </m:r>
+                        <m:r>
+                          <a:rPr lang="en-US" altLang="ko-KR" b="0" i="1" smtClean="0">
+                            <a:solidFill>
+                              <a:srgbClr val="FF0000"/>
+                            </a:solidFill>
+                            <a:latin typeface="Cambria Math" panose="02040503050406030204" pitchFamily="18" charset="0"/>
+                          </a:rPr>
+                          <m:t>𝑂</m:t>
+                        </m:r>
+                        <m:r>
+                          <a:rPr lang="en-US" altLang="ko-KR" b="0" i="1" smtClean="0">
+                            <a:solidFill>
+                              <a:srgbClr val="FF0000"/>
+                            </a:solidFill>
+                            <a:latin typeface="Cambria Math" panose="02040503050406030204" pitchFamily="18" charset="0"/>
+                          </a:rPr>
+                          <m:t>2</m:t>
+                        </m:r>
+                      </m:num>
+                      <m:den>
+                        <m:r>
+                          <a:rPr lang="ko-KR" altLang="en-US" i="1">
+                            <a:solidFill>
+                              <a:srgbClr val="FF0000"/>
+                            </a:solidFill>
+                            <a:latin typeface="Cambria Math" panose="02040503050406030204" pitchFamily="18" charset="0"/>
+                          </a:rPr>
+                          <m:t>𝜕</m:t>
+                        </m:r>
+                        <m:r>
+                          <a:rPr lang="en-US" altLang="ko-KR" b="0" i="1" smtClean="0">
+                            <a:solidFill>
+                              <a:srgbClr val="FF0000"/>
+                            </a:solidFill>
+                            <a:latin typeface="Cambria Math" panose="02040503050406030204" pitchFamily="18" charset="0"/>
+                          </a:rPr>
+                          <m:t>𝐼</m:t>
+                        </m:r>
+                        <m:r>
+                          <a:rPr lang="en-US" altLang="ko-KR" b="0" i="1" smtClean="0">
+                            <a:solidFill>
+                              <a:srgbClr val="FF0000"/>
+                            </a:solidFill>
+                            <a:latin typeface="Cambria Math" panose="02040503050406030204" pitchFamily="18" charset="0"/>
+                          </a:rPr>
+                          <m:t>2</m:t>
+                        </m:r>
+                      </m:den>
+                    </m:f>
+                    <m:f>
+                      <m:fPr>
+                        <m:ctrlPr>
+                          <a:rPr lang="en-US" altLang="ko-KR" i="1" smtClean="0">
+                            <a:latin typeface="Cambria Math" panose="02040503050406030204" pitchFamily="18" charset="0"/>
+                          </a:rPr>
+                        </m:ctrlPr>
+                      </m:fPr>
+                      <m:num>
+                        <m:r>
+                          <a:rPr lang="ko-KR" altLang="en-US" i="1">
+                            <a:latin typeface="Cambria Math" panose="02040503050406030204" pitchFamily="18" charset="0"/>
+                          </a:rPr>
+                          <m:t>𝜕</m:t>
+                        </m:r>
+                        <m:r>
+                          <a:rPr lang="en-US" altLang="ko-KR" b="0" i="1" smtClean="0">
+                            <a:latin typeface="Cambria Math" panose="02040503050406030204" pitchFamily="18" charset="0"/>
+                          </a:rPr>
+                          <m:t>𝐼</m:t>
+                        </m:r>
+                        <m:r>
+                          <a:rPr lang="en-US" altLang="ko-KR" b="0" i="1" smtClean="0">
+                            <a:latin typeface="Cambria Math" panose="02040503050406030204" pitchFamily="18" charset="0"/>
+                          </a:rPr>
+                          <m:t>2</m:t>
+                        </m:r>
+                      </m:num>
+                      <m:den>
+                        <m:r>
+                          <a:rPr lang="ko-KR" altLang="en-US" i="1">
+                            <a:latin typeface="Cambria Math" panose="02040503050406030204" pitchFamily="18" charset="0"/>
+                          </a:rPr>
+                          <m:t>𝜕</m:t>
+                        </m:r>
+                        <m:r>
+                          <a:rPr lang="en-US" altLang="ko-KR" b="0" i="1" smtClean="0">
+                            <a:latin typeface="Cambria Math" panose="02040503050406030204" pitchFamily="18" charset="0"/>
+                          </a:rPr>
+                          <m:t>𝑊</m:t>
+                        </m:r>
+                        <m:r>
+                          <a:rPr lang="en-US" altLang="ko-KR" b="0" i="1" smtClean="0">
+                            <a:latin typeface="Cambria Math" panose="02040503050406030204" pitchFamily="18" charset="0"/>
+                          </a:rPr>
+                          <m:t>2</m:t>
+                        </m:r>
+                      </m:den>
+                    </m:f>
+                  </m:oMath>
+                </a14:m>
+                <a:endParaRPr lang="en-US" altLang="ko-KR" dirty="0"/>
+              </a:p>
+              <a:p>
+                <a:endParaRPr lang="en-US" altLang="ko-KR" dirty="0"/>
+              </a:p>
+              <a:p>
+                <a:r>
+                  <a:rPr lang="en-US" altLang="ko-KR" dirty="0"/>
+                  <a:t>BN </a:t>
+                </a:r>
+                <a:r>
+                  <a:rPr lang="ko-KR" altLang="en-US" dirty="0"/>
+                  <a:t>적용</a:t>
+                </a:r>
+                <a:r>
+                  <a:rPr lang="en-US" altLang="ko-KR" dirty="0"/>
+                  <a:t>:</a:t>
+                </a:r>
+              </a:p>
+              <a:p>
+                <a:r>
+                  <a:rPr lang="en-US" altLang="ko-KR" dirty="0"/>
+                  <a:t>O2 = act32BN(I2 = </a:t>
+                </a:r>
+                <a:r>
+                  <a:rPr lang="el-GR" altLang="ko-KR" dirty="0">
+                    <a:ea typeface="맑은 고딕" panose="020B0503020000020004" pitchFamily="50" charset="-127"/>
+                  </a:rPr>
+                  <a:t>Σ</a:t>
+                </a:r>
+                <a:r>
+                  <a:rPr lang="en-US" altLang="ko-KR" dirty="0"/>
+                  <a:t>W2*O1+B2</a:t>
+                </a:r>
+                <a:r>
+                  <a:rPr lang="en-US" altLang="ko-KR" dirty="0">
+                    <a:ea typeface="맑은 고딕" panose="020B0503020000020004" pitchFamily="50" charset="-127"/>
+                  </a:rPr>
+                  <a:t>))</a:t>
+                </a:r>
+                <a:endParaRPr lang="en-US" altLang="ko-KR" dirty="0"/>
+              </a:p>
+              <a:p>
+                <a:pPr/>
+                <a14:m>
+                  <m:oMath xmlns:m="http://schemas.openxmlformats.org/officeDocument/2006/math">
+                    <m:f>
+                      <m:fPr>
+                        <m:ctrlPr>
+                          <a:rPr lang="en-US" altLang="ko-KR" i="1">
+                            <a:latin typeface="Cambria Math" panose="02040503050406030204" pitchFamily="18" charset="0"/>
+                          </a:rPr>
+                        </m:ctrlPr>
+                      </m:fPr>
+                      <m:num>
+                        <m:r>
+                          <a:rPr lang="ko-KR" altLang="en-US" i="1">
+                            <a:latin typeface="Cambria Math" panose="02040503050406030204" pitchFamily="18" charset="0"/>
+                          </a:rPr>
+                          <m:t>𝜕</m:t>
+                        </m:r>
+                        <m:r>
+                          <a:rPr lang="en-US" altLang="ko-KR" i="1">
+                            <a:latin typeface="Cambria Math" panose="02040503050406030204" pitchFamily="18" charset="0"/>
+                          </a:rPr>
+                          <m:t>𝐿𝑜𝑠𝑠</m:t>
+                        </m:r>
+                      </m:num>
+                      <m:den>
+                        <m:r>
+                          <a:rPr lang="ko-KR" altLang="en-US" i="1">
+                            <a:latin typeface="Cambria Math" panose="02040503050406030204" pitchFamily="18" charset="0"/>
+                          </a:rPr>
+                          <m:t>𝜕</m:t>
+                        </m:r>
+                        <m:r>
+                          <a:rPr lang="en-US" altLang="ko-KR" b="0" i="1" smtClean="0">
+                            <a:latin typeface="Cambria Math" panose="02040503050406030204" pitchFamily="18" charset="0"/>
+                          </a:rPr>
+                          <m:t>𝑊</m:t>
+                        </m:r>
+                        <m:r>
+                          <a:rPr lang="en-US" altLang="ko-KR" b="0" i="1" smtClean="0">
+                            <a:latin typeface="Cambria Math" panose="02040503050406030204" pitchFamily="18" charset="0"/>
+                          </a:rPr>
+                          <m:t>2</m:t>
+                        </m:r>
+                      </m:den>
+                    </m:f>
+                    <m:r>
+                      <a:rPr lang="en-US" altLang="ko-KR" b="0" i="1" smtClean="0">
+                        <a:latin typeface="Cambria Math" panose="02040503050406030204" pitchFamily="18" charset="0"/>
+                      </a:rPr>
+                      <m:t>=</m:t>
+                    </m:r>
+                    <m:f>
+                      <m:fPr>
+                        <m:ctrlPr>
+                          <a:rPr lang="en-US" altLang="ko-KR" i="1">
+                            <a:latin typeface="Cambria Math" panose="02040503050406030204" pitchFamily="18" charset="0"/>
+                          </a:rPr>
+                        </m:ctrlPr>
+                      </m:fPr>
+                      <m:num>
+                        <m:r>
+                          <a:rPr lang="ko-KR" altLang="en-US" i="1">
+                            <a:latin typeface="Cambria Math" panose="02040503050406030204" pitchFamily="18" charset="0"/>
+                          </a:rPr>
+                          <m:t>𝜕</m:t>
+                        </m:r>
+                        <m:r>
+                          <a:rPr lang="en-US" altLang="ko-KR" i="1">
+                            <a:latin typeface="Cambria Math" panose="02040503050406030204" pitchFamily="18" charset="0"/>
+                          </a:rPr>
+                          <m:t>𝐿𝑜𝑠𝑠</m:t>
+                        </m:r>
+                      </m:num>
+                      <m:den>
+                        <m:r>
+                          <a:rPr lang="ko-KR" altLang="en-US" i="1">
+                            <a:latin typeface="Cambria Math" panose="02040503050406030204" pitchFamily="18" charset="0"/>
+                          </a:rPr>
+                          <m:t>𝜕</m:t>
+                        </m:r>
+                        <m:r>
+                          <a:rPr lang="en-US" altLang="ko-KR" i="1">
+                            <a:latin typeface="Cambria Math" panose="02040503050406030204" pitchFamily="18" charset="0"/>
+                          </a:rPr>
+                          <m:t>𝑂</m:t>
+                        </m:r>
+                        <m:r>
+                          <a:rPr lang="en-US" altLang="ko-KR" b="0" i="1" smtClean="0">
+                            <a:latin typeface="Cambria Math" panose="02040503050406030204" pitchFamily="18" charset="0"/>
+                          </a:rPr>
+                          <m:t>2</m:t>
+                        </m:r>
+                      </m:den>
+                    </m:f>
+                    <m:f>
+                      <m:fPr>
+                        <m:ctrlPr>
+                          <a:rPr lang="en-US" altLang="ko-KR" i="1" smtClean="0">
+                            <a:solidFill>
+                              <a:srgbClr val="FF0000"/>
+                            </a:solidFill>
+                            <a:latin typeface="Cambria Math" panose="02040503050406030204" pitchFamily="18" charset="0"/>
+                          </a:rPr>
+                        </m:ctrlPr>
+                      </m:fPr>
+                      <m:num>
+                        <m:r>
+                          <a:rPr lang="ko-KR" altLang="en-US" i="1">
+                            <a:solidFill>
+                              <a:srgbClr val="FF0000"/>
+                            </a:solidFill>
+                            <a:latin typeface="Cambria Math" panose="02040503050406030204" pitchFamily="18" charset="0"/>
+                          </a:rPr>
+                          <m:t>𝜕</m:t>
+                        </m:r>
+                        <m:r>
+                          <a:rPr lang="en-US" altLang="ko-KR" i="1">
+                            <a:solidFill>
+                              <a:srgbClr val="FF0000"/>
+                            </a:solidFill>
+                            <a:latin typeface="Cambria Math" panose="02040503050406030204" pitchFamily="18" charset="0"/>
+                          </a:rPr>
+                          <m:t>𝑂</m:t>
+                        </m:r>
+                        <m:r>
+                          <a:rPr lang="en-US" altLang="ko-KR" i="1">
+                            <a:solidFill>
+                              <a:srgbClr val="FF0000"/>
+                            </a:solidFill>
+                            <a:latin typeface="Cambria Math" panose="02040503050406030204" pitchFamily="18" charset="0"/>
+                          </a:rPr>
+                          <m:t>3</m:t>
+                        </m:r>
+                      </m:num>
+                      <m:den>
+                        <m:r>
+                          <a:rPr lang="ko-KR" altLang="en-US" i="1">
+                            <a:solidFill>
+                              <a:srgbClr val="FF0000"/>
+                            </a:solidFill>
+                            <a:latin typeface="Cambria Math" panose="02040503050406030204" pitchFamily="18" charset="0"/>
+                          </a:rPr>
+                          <m:t>𝜕</m:t>
+                        </m:r>
+                        <m:r>
+                          <a:rPr lang="en-US" altLang="ko-KR" b="0" i="1" smtClean="0">
+                            <a:solidFill>
+                              <a:srgbClr val="FF0000"/>
+                            </a:solidFill>
+                            <a:latin typeface="Cambria Math" panose="02040503050406030204" pitchFamily="18" charset="0"/>
+                          </a:rPr>
+                          <m:t>𝐵𝑁</m:t>
+                        </m:r>
+                        <m:r>
+                          <a:rPr lang="en-US" altLang="ko-KR" b="0" i="1" smtClean="0">
+                            <a:solidFill>
+                              <a:srgbClr val="FF0000"/>
+                            </a:solidFill>
+                            <a:latin typeface="Cambria Math" panose="02040503050406030204" pitchFamily="18" charset="0"/>
+                          </a:rPr>
+                          <m:t>2</m:t>
+                        </m:r>
+                      </m:den>
+                    </m:f>
+                    <m:f>
+                      <m:fPr>
+                        <m:ctrlPr>
+                          <a:rPr lang="en-US" altLang="ko-KR" i="1">
+                            <a:solidFill>
+                              <a:srgbClr val="FF0000"/>
+                            </a:solidFill>
+                            <a:latin typeface="Cambria Math" panose="02040503050406030204" pitchFamily="18" charset="0"/>
+                          </a:rPr>
+                        </m:ctrlPr>
+                      </m:fPr>
+                      <m:num>
+                        <m:r>
+                          <a:rPr lang="ko-KR" altLang="en-US" i="1">
+                            <a:solidFill>
+                              <a:srgbClr val="FF0000"/>
+                            </a:solidFill>
+                            <a:latin typeface="Cambria Math" panose="02040503050406030204" pitchFamily="18" charset="0"/>
+                          </a:rPr>
+                          <m:t>𝜕</m:t>
+                        </m:r>
+                        <m:r>
+                          <a:rPr lang="en-US" altLang="ko-KR" b="0" i="1" smtClean="0">
+                            <a:solidFill>
+                              <a:srgbClr val="FF0000"/>
+                            </a:solidFill>
+                            <a:latin typeface="Cambria Math" panose="02040503050406030204" pitchFamily="18" charset="0"/>
+                          </a:rPr>
+                          <m:t>𝐵𝑁</m:t>
+                        </m:r>
+                        <m:r>
+                          <a:rPr lang="en-US" altLang="ko-KR" i="1">
+                            <a:solidFill>
+                              <a:srgbClr val="FF0000"/>
+                            </a:solidFill>
+                            <a:latin typeface="Cambria Math" panose="02040503050406030204" pitchFamily="18" charset="0"/>
+                          </a:rPr>
+                          <m:t>3</m:t>
+                        </m:r>
+                      </m:num>
+                      <m:den>
+                        <m:r>
+                          <a:rPr lang="ko-KR" altLang="en-US" i="1">
+                            <a:solidFill>
+                              <a:srgbClr val="FF0000"/>
+                            </a:solidFill>
+                            <a:latin typeface="Cambria Math" panose="02040503050406030204" pitchFamily="18" charset="0"/>
+                          </a:rPr>
+                          <m:t>𝜕</m:t>
+                        </m:r>
+                        <m:r>
+                          <a:rPr lang="en-US" altLang="ko-KR" b="0" i="1" smtClean="0">
+                            <a:solidFill>
+                              <a:srgbClr val="FF0000"/>
+                            </a:solidFill>
+                            <a:latin typeface="Cambria Math" panose="02040503050406030204" pitchFamily="18" charset="0"/>
+                          </a:rPr>
+                          <m:t>𝑋</m:t>
+                        </m:r>
+                      </m:den>
+                    </m:f>
+                    <m:f>
+                      <m:fPr>
+                        <m:ctrlPr>
+                          <a:rPr lang="en-US" altLang="ko-KR" i="1">
+                            <a:latin typeface="Cambria Math" panose="02040503050406030204" pitchFamily="18" charset="0"/>
+                          </a:rPr>
+                        </m:ctrlPr>
+                      </m:fPr>
+                      <m:num>
+                        <m:r>
+                          <a:rPr lang="ko-KR" altLang="en-US" i="1">
+                            <a:latin typeface="Cambria Math" panose="02040503050406030204" pitchFamily="18" charset="0"/>
+                          </a:rPr>
+                          <m:t>𝜕</m:t>
+                        </m:r>
+                        <m:r>
+                          <a:rPr lang="en-US" altLang="ko-KR" b="0" i="1" smtClean="0">
+                            <a:latin typeface="Cambria Math" panose="02040503050406030204" pitchFamily="18" charset="0"/>
+                          </a:rPr>
+                          <m:t>𝑋</m:t>
+                        </m:r>
+                      </m:num>
+                      <m:den>
+                        <m:r>
+                          <a:rPr lang="ko-KR" altLang="en-US" i="1">
+                            <a:latin typeface="Cambria Math" panose="02040503050406030204" pitchFamily="18" charset="0"/>
+                          </a:rPr>
+                          <m:t>𝜕</m:t>
+                        </m:r>
+                        <m:r>
+                          <a:rPr lang="en-US" altLang="ko-KR" i="1">
+                            <a:latin typeface="Cambria Math" panose="02040503050406030204" pitchFamily="18" charset="0"/>
+                          </a:rPr>
+                          <m:t>𝑊</m:t>
+                        </m:r>
+                        <m:r>
+                          <a:rPr lang="en-US" altLang="ko-KR" b="0" i="1" smtClean="0">
+                            <a:latin typeface="Cambria Math" panose="02040503050406030204" pitchFamily="18" charset="0"/>
+                          </a:rPr>
+                          <m:t>2</m:t>
+                        </m:r>
+                      </m:den>
+                    </m:f>
+                  </m:oMath>
+                </a14:m>
+                <a:endParaRPr lang="en-US" altLang="ko-KR" dirty="0"/>
+              </a:p>
+              <a:p>
+                <a:endParaRPr lang="en-US" altLang="ko-KR" dirty="0"/>
+              </a:p>
+              <a:p>
+                <a:endParaRPr lang="ko-KR" altLang="en-US" dirty="0"/>
+              </a:p>
+            </p:txBody>
+          </p:sp>
+        </mc:Choice>
+        <mc:Fallback>
+          <p:sp>
+            <p:nvSpPr>
+              <p:cNvPr id="3" name="내용 개체 틀 2">
+                <a:extLst>
+                  <a:ext uri="{FF2B5EF4-FFF2-40B4-BE49-F238E27FC236}">
+                    <a16:creationId xmlns:a16="http://schemas.microsoft.com/office/drawing/2014/main" id="{584DBC28-F541-4D5A-92A9-8F87F5EEE9EA}"/>
+                  </a:ext>
+                </a:extLst>
+              </p:cNvPr>
+              <p:cNvSpPr>
+                <a:spLocks noGrp="1" noRot="1" noChangeAspect="1" noMove="1" noResize="1" noEditPoints="1" noAdjustHandles="1" noChangeArrowheads="1" noChangeShapeType="1" noTextEdit="1"/>
+              </p:cNvSpPr>
+              <p:nvPr>
+                <p:ph idx="1"/>
+              </p:nvPr>
+            </p:nvSpPr>
+            <p:spPr>
+              <a:blipFill>
+                <a:blip r:embed="rId2"/>
+                <a:stretch>
+                  <a:fillRect l="-606" t="-1970"/>
+                </a:stretch>
+              </a:blipFill>
+            </p:spPr>
+            <p:txBody>
+              <a:bodyPr/>
+              <a:lstStyle/>
+              <a:p>
+                <a:r>
+                  <a:rPr lang="ko-KR" altLang="en-US">
+                    <a:noFill/>
+                  </a:rPr>
+                  <a:t> </a:t>
+                </a:r>
+              </a:p>
+            </p:txBody>
+          </p:sp>
+        </mc:Fallback>
+      </mc:AlternateContent>
+      <p:pic>
+        <p:nvPicPr>
+          <p:cNvPr id="6" name="내용 개체 틀 13">
             <a:extLst>
               <a:ext uri="{FF2B5EF4-FFF2-40B4-BE49-F238E27FC236}">
-                <a16:creationId xmlns:a16="http://schemas.microsoft.com/office/drawing/2014/main" id="{12BC1828-6619-4305-8D66-B3B82EC770A8}"/>
+                <a16:creationId xmlns:a16="http://schemas.microsoft.com/office/drawing/2014/main" id="{F36EAE6B-997D-4EDD-8E1C-CBD9A299B467}"/>
               </a:ext>
             </a:extLst>
           </p:cNvPr>
-          <p:cNvSpPr>
-            <a:spLocks noGrp="1"/>
-          </p:cNvSpPr>
-          <p:nvPr>
-            <p:ph idx="1"/>
-          </p:nvPr>
-        </p:nvSpPr>
-        <p:spPr/>
-        <p:txBody>
-          <a:bodyPr/>
-          <a:lstStyle/>
-          <a:p>
-            <a:r>
-              <a:rPr lang="en-US" altLang="ko-KR" dirty="0"/>
-              <a:t>Test </a:t>
-            </a:r>
-            <a:r>
-              <a:rPr lang="ko-KR" altLang="en-US" dirty="0"/>
-              <a:t>단계</a:t>
-            </a:r>
-            <a:endParaRPr lang="en-US" altLang="ko-KR" dirty="0"/>
-          </a:p>
-          <a:p>
-            <a:endParaRPr lang="en-US" altLang="ko-KR" dirty="0"/>
-          </a:p>
-          <a:p>
-            <a:r>
-              <a:rPr lang="en-US" altLang="ko-KR" dirty="0"/>
-              <a:t>Normalization</a:t>
-            </a:r>
-            <a:r>
-              <a:rPr lang="ko-KR" altLang="en-US" dirty="0"/>
-              <a:t>에 필요한 </a:t>
-            </a:r>
-            <a:r>
-              <a:rPr lang="en-US" altLang="ko-KR" dirty="0"/>
-              <a:t>mean, variance</a:t>
-            </a:r>
-            <a:r>
-              <a:rPr lang="ko-KR" altLang="en-US" dirty="0"/>
-              <a:t>를</a:t>
-            </a:r>
-            <a:r>
-              <a:rPr lang="en-US" altLang="ko-KR" dirty="0"/>
-              <a:t>,  </a:t>
-            </a:r>
-            <a:r>
-              <a:rPr lang="ko-KR" altLang="en-US" dirty="0"/>
-              <a:t>그동안 계산했던 </a:t>
-            </a:r>
-            <a:r>
-              <a:rPr lang="en-US" altLang="ko-KR" dirty="0"/>
-              <a:t>mean, variance</a:t>
-            </a:r>
-            <a:r>
-              <a:rPr lang="ko-KR" altLang="en-US" dirty="0"/>
-              <a:t>의 평균으로 놓고 </a:t>
-            </a:r>
-            <a:r>
-              <a:rPr lang="en-US" altLang="ko-KR" dirty="0"/>
-              <a:t>output</a:t>
-            </a:r>
-            <a:r>
-              <a:rPr lang="ko-KR" altLang="en-US" dirty="0"/>
-              <a:t>을 구한다</a:t>
-            </a:r>
-            <a:r>
-              <a:rPr lang="en-US" altLang="ko-KR" dirty="0"/>
-              <a:t>.</a:t>
-            </a:r>
-            <a:endParaRPr lang="ko-KR" altLang="en-US" dirty="0"/>
-          </a:p>
-        </p:txBody>
-      </p:sp>
+          <p:cNvPicPr>
+            <a:picLocks noChangeAspect="1"/>
+          </p:cNvPicPr>
+          <p:nvPr/>
+        </p:nvPicPr>
+        <p:blipFill rotWithShape="1">
+          <a:blip r:embed="rId3"/>
+          <a:srcRect l="28761"/>
+          <a:stretch/>
+        </p:blipFill>
+        <p:spPr>
+          <a:xfrm>
+            <a:off x="4961614" y="1845734"/>
+            <a:ext cx="6194066" cy="4189542"/>
+          </a:xfrm>
+          <a:prstGeom prst="rect">
+            <a:avLst/>
+          </a:prstGeom>
+        </p:spPr>
+      </p:pic>
+      <p:cxnSp>
+        <p:nvCxnSpPr>
+          <p:cNvPr id="15" name="직선 화살표 연결선 14">
+            <a:extLst>
+              <a:ext uri="{FF2B5EF4-FFF2-40B4-BE49-F238E27FC236}">
+                <a16:creationId xmlns:a16="http://schemas.microsoft.com/office/drawing/2014/main" id="{0F5D0D57-24E0-4E28-AD35-6C93917B8B90}"/>
+              </a:ext>
+            </a:extLst>
+          </p:cNvPr>
+          <p:cNvCxnSpPr>
+            <a:cxnSpLocks/>
+          </p:cNvCxnSpPr>
+          <p:nvPr/>
+        </p:nvCxnSpPr>
+        <p:spPr>
+          <a:xfrm flipH="1">
+            <a:off x="3445565" y="4293704"/>
+            <a:ext cx="1736035" cy="781879"/>
+          </a:xfrm>
+          <a:prstGeom prst="straightConnector1">
+            <a:avLst/>
+          </a:prstGeom>
+          <a:ln w="25400">
+            <a:solidFill>
+              <a:srgbClr val="FF0000"/>
+            </a:solidFill>
+            <a:tailEnd type="triangle"/>
+          </a:ln>
+        </p:spPr>
+        <p:style>
+          <a:lnRef idx="1">
+            <a:schemeClr val="accent1"/>
+          </a:lnRef>
+          <a:fillRef idx="0">
+            <a:schemeClr val="accent1"/>
+          </a:fillRef>
+          <a:effectRef idx="0">
+            <a:schemeClr val="accent1"/>
+          </a:effectRef>
+          <a:fontRef idx="minor">
+            <a:schemeClr val="tx1"/>
+          </a:fontRef>
+        </p:style>
+      </p:cxnSp>
     </p:spTree>
     <p:extLst>
       <p:ext uri="{BB962C8B-B14F-4D97-AF65-F5344CB8AC3E}">
-        <p14:creationId xmlns:p14="http://schemas.microsoft.com/office/powerpoint/2010/main" val="209752006"/>
+        <p14:creationId xmlns:p14="http://schemas.microsoft.com/office/powerpoint/2010/main" val="1355575966"/>
       </p:ext>
     </p:extLst>
   </p:cSld>
@@ -5598,6 +6837,725 @@
           <p:cNvPr id="2" name="제목 1">
             <a:extLst>
               <a:ext uri="{FF2B5EF4-FFF2-40B4-BE49-F238E27FC236}">
+                <a16:creationId xmlns:a16="http://schemas.microsoft.com/office/drawing/2014/main" id="{053C390E-467C-4471-A616-88EEE7DACD9D}"/>
+              </a:ext>
+            </a:extLst>
+          </p:cNvPr>
+          <p:cNvSpPr>
+            <a:spLocks noGrp="1"/>
+          </p:cNvSpPr>
+          <p:nvPr>
+            <p:ph type="title"/>
+          </p:nvPr>
+        </p:nvSpPr>
+        <p:spPr/>
+        <p:txBody>
+          <a:bodyPr/>
+          <a:lstStyle/>
+          <a:p>
+            <a:r>
+              <a:rPr lang="en-US" altLang="ko-KR" dirty="0"/>
+              <a:t>Batch-Normalization</a:t>
+            </a:r>
+            <a:endParaRPr lang="ko-KR" altLang="en-US" dirty="0"/>
+          </a:p>
+        </p:txBody>
+      </p:sp>
+      <mc:AlternateContent xmlns:mc="http://schemas.openxmlformats.org/markup-compatibility/2006">
+        <mc:Choice xmlns:a14="http://schemas.microsoft.com/office/drawing/2010/main" Requires="a14">
+          <p:sp>
+            <p:nvSpPr>
+              <p:cNvPr id="3" name="내용 개체 틀 2">
+                <a:extLst>
+                  <a:ext uri="{FF2B5EF4-FFF2-40B4-BE49-F238E27FC236}">
+                    <a16:creationId xmlns:a16="http://schemas.microsoft.com/office/drawing/2014/main" id="{3CC461E5-B556-41EC-A6D9-6253D95057D4}"/>
+                  </a:ext>
+                </a:extLst>
+              </p:cNvPr>
+              <p:cNvSpPr>
+                <a:spLocks noGrp="1"/>
+              </p:cNvSpPr>
+              <p:nvPr>
+                <p:ph idx="1"/>
+              </p:nvPr>
+            </p:nvSpPr>
+            <p:spPr/>
+            <p:txBody>
+              <a:bodyPr>
+                <a:normAutofit fontScale="70000" lnSpcReduction="20000"/>
+              </a:bodyPr>
+              <a:lstStyle/>
+              <a:p>
+                <a:r>
+                  <a:rPr lang="en-US" altLang="ko-KR" sz="3600" dirty="0"/>
+                  <a:t>Y’=Y-E[Y], Y=</a:t>
+                </a:r>
+                <a:r>
+                  <a:rPr lang="en-US" altLang="ko-KR" sz="3600" dirty="0" err="1"/>
+                  <a:t>x+b</a:t>
+                </a:r>
+                <a:r>
+                  <a:rPr lang="en-US" altLang="ko-KR" sz="3600" dirty="0"/>
+                  <a:t> </a:t>
+                </a:r>
+                <a:r>
+                  <a:rPr lang="ko-KR" altLang="en-US" sz="3600" dirty="0"/>
+                  <a:t>에 적용해보면</a:t>
+                </a:r>
+                <a:endParaRPr lang="en-US" altLang="ko-KR" sz="3600" dirty="0"/>
+              </a:p>
+              <a:p>
+                <a14:m>
+                  <m:oMath xmlns:m="http://schemas.openxmlformats.org/officeDocument/2006/math">
+                    <m:r>
+                      <a:rPr lang="en-US" altLang="ko-KR" sz="3600" b="0" i="1" smtClean="0">
+                        <a:latin typeface="Cambria Math" panose="02040503050406030204" pitchFamily="18" charset="0"/>
+                      </a:rPr>
+                      <m:t>𝐸</m:t>
+                    </m:r>
+                    <m:d>
+                      <m:dPr>
+                        <m:begChr m:val="["/>
+                        <m:endChr m:val="]"/>
+                        <m:ctrlPr>
+                          <a:rPr lang="en-US" altLang="ko-KR" sz="3600" b="0" i="1" smtClean="0">
+                            <a:latin typeface="Cambria Math" panose="02040503050406030204" pitchFamily="18" charset="0"/>
+                          </a:rPr>
+                        </m:ctrlPr>
+                      </m:dPr>
+                      <m:e>
+                        <m:r>
+                          <a:rPr lang="en-US" altLang="ko-KR" sz="3600" b="0" i="1" smtClean="0">
+                            <a:latin typeface="Cambria Math" panose="02040503050406030204" pitchFamily="18" charset="0"/>
+                          </a:rPr>
+                          <m:t>𝑌</m:t>
+                        </m:r>
+                      </m:e>
+                    </m:d>
+                    <m:r>
+                      <a:rPr lang="en-US" altLang="ko-KR" sz="3600" b="0" i="1" smtClean="0">
+                        <a:latin typeface="Cambria Math" panose="02040503050406030204" pitchFamily="18" charset="0"/>
+                      </a:rPr>
+                      <m:t>= </m:t>
+                    </m:r>
+                    <m:f>
+                      <m:fPr>
+                        <m:ctrlPr>
+                          <a:rPr lang="en-US" altLang="ko-KR" sz="3600" b="0" i="1" smtClean="0">
+                            <a:latin typeface="Cambria Math" panose="02040503050406030204" pitchFamily="18" charset="0"/>
+                          </a:rPr>
+                        </m:ctrlPr>
+                      </m:fPr>
+                      <m:num>
+                        <m:r>
+                          <a:rPr lang="en-US" altLang="ko-KR" sz="3600" b="0" i="1" smtClean="0">
+                            <a:latin typeface="Cambria Math" panose="02040503050406030204" pitchFamily="18" charset="0"/>
+                          </a:rPr>
+                          <m:t>1</m:t>
+                        </m:r>
+                      </m:num>
+                      <m:den>
+                        <m:r>
+                          <a:rPr lang="en-US" altLang="ko-KR" sz="3600" b="0" i="1" smtClean="0">
+                            <a:latin typeface="Cambria Math" panose="02040503050406030204" pitchFamily="18" charset="0"/>
+                          </a:rPr>
+                          <m:t>𝑛</m:t>
+                        </m:r>
+                      </m:den>
+                    </m:f>
+                    <m:nary>
+                      <m:naryPr>
+                        <m:chr m:val="∑"/>
+                        <m:subHide m:val="on"/>
+                        <m:supHide m:val="on"/>
+                        <m:ctrlPr>
+                          <a:rPr lang="en-US" altLang="ko-KR" sz="3600" b="0" i="1" smtClean="0">
+                            <a:latin typeface="Cambria Math" panose="02040503050406030204" pitchFamily="18" charset="0"/>
+                          </a:rPr>
+                        </m:ctrlPr>
+                      </m:naryPr>
+                      <m:sub/>
+                      <m:sup/>
+                      <m:e>
+                        <m:r>
+                          <a:rPr lang="en-US" altLang="ko-KR" sz="3600" b="0" i="1" smtClean="0">
+                            <a:latin typeface="Cambria Math" panose="02040503050406030204" pitchFamily="18" charset="0"/>
+                          </a:rPr>
+                          <m:t>(</m:t>
+                        </m:r>
+                        <m:r>
+                          <a:rPr lang="en-US" altLang="ko-KR" sz="3600" b="0" i="1" smtClean="0">
+                            <a:latin typeface="Cambria Math" panose="02040503050406030204" pitchFamily="18" charset="0"/>
+                          </a:rPr>
+                          <m:t>𝑥</m:t>
+                        </m:r>
+                        <m:r>
+                          <a:rPr lang="en-US" altLang="ko-KR" sz="3600" b="0" i="1" smtClean="0">
+                            <a:latin typeface="Cambria Math" panose="02040503050406030204" pitchFamily="18" charset="0"/>
+                          </a:rPr>
+                          <m:t>+</m:t>
+                        </m:r>
+                        <m:r>
+                          <a:rPr lang="en-US" altLang="ko-KR" sz="3600" b="0" i="1" smtClean="0">
+                            <a:latin typeface="Cambria Math" panose="02040503050406030204" pitchFamily="18" charset="0"/>
+                          </a:rPr>
+                          <m:t>𝑏</m:t>
+                        </m:r>
+                        <m:r>
+                          <a:rPr lang="en-US" altLang="ko-KR" sz="3600" b="0" i="1" smtClean="0">
+                            <a:latin typeface="Cambria Math" panose="02040503050406030204" pitchFamily="18" charset="0"/>
+                          </a:rPr>
+                          <m:t>)</m:t>
+                        </m:r>
+                      </m:e>
+                    </m:nary>
+                  </m:oMath>
+                </a14:m>
+                <a:endParaRPr lang="en-US" altLang="ko-KR" sz="3600" b="0" dirty="0"/>
+              </a:p>
+              <a:p>
+                <a14:m>
+                  <m:oMath xmlns:m="http://schemas.openxmlformats.org/officeDocument/2006/math">
+                    <m:f>
+                      <m:fPr>
+                        <m:ctrlPr>
+                          <a:rPr lang="en-US" altLang="ko-KR" sz="3600" i="1" smtClean="0">
+                            <a:latin typeface="Cambria Math" panose="02040503050406030204" pitchFamily="18" charset="0"/>
+                            <a:ea typeface="맑은 고딕" panose="020B0503020000020004" pitchFamily="50" charset="-127"/>
+                          </a:rPr>
+                        </m:ctrlPr>
+                      </m:fPr>
+                      <m:num>
+                        <m:r>
+                          <a:rPr lang="ko-KR" altLang="en-US" sz="3600" i="1" smtClean="0">
+                            <a:latin typeface="Cambria Math" panose="02040503050406030204" pitchFamily="18" charset="0"/>
+                            <a:ea typeface="맑은 고딕" panose="020B0503020000020004" pitchFamily="50" charset="-127"/>
+                          </a:rPr>
+                          <m:t>𝜕</m:t>
+                        </m:r>
+                        <m:r>
+                          <a:rPr lang="en-US" altLang="ko-KR" sz="3600" b="0" i="1" smtClean="0">
+                            <a:latin typeface="Cambria Math" panose="02040503050406030204" pitchFamily="18" charset="0"/>
+                            <a:ea typeface="맑은 고딕" panose="020B0503020000020004" pitchFamily="50" charset="-127"/>
+                          </a:rPr>
+                          <m:t>𝑙</m:t>
+                        </m:r>
+                      </m:num>
+                      <m:den>
+                        <m:r>
+                          <a:rPr lang="ko-KR" altLang="en-US" sz="3600" i="1" smtClean="0">
+                            <a:latin typeface="Cambria Math" panose="02040503050406030204" pitchFamily="18" charset="0"/>
+                            <a:ea typeface="맑은 고딕" panose="020B0503020000020004" pitchFamily="50" charset="-127"/>
+                          </a:rPr>
+                          <m:t>𝜕</m:t>
+                        </m:r>
+                        <m:r>
+                          <a:rPr lang="en-US" altLang="ko-KR" sz="3600" b="0" i="1" smtClean="0">
+                            <a:latin typeface="Cambria Math" panose="02040503050406030204" pitchFamily="18" charset="0"/>
+                            <a:ea typeface="맑은 고딕" panose="020B0503020000020004" pitchFamily="50" charset="-127"/>
+                          </a:rPr>
+                          <m:t>𝐸</m:t>
+                        </m:r>
+                        <m:r>
+                          <a:rPr lang="en-US" altLang="ko-KR" sz="3600" b="0" i="1" smtClean="0">
+                            <a:latin typeface="Cambria Math" panose="02040503050406030204" pitchFamily="18" charset="0"/>
+                            <a:ea typeface="맑은 고딕" panose="020B0503020000020004" pitchFamily="50" charset="-127"/>
+                          </a:rPr>
+                          <m:t>[</m:t>
+                        </m:r>
+                        <m:r>
+                          <a:rPr lang="en-US" altLang="ko-KR" sz="3600" b="0" i="1" smtClean="0">
+                            <a:latin typeface="Cambria Math" panose="02040503050406030204" pitchFamily="18" charset="0"/>
+                            <a:ea typeface="맑은 고딕" panose="020B0503020000020004" pitchFamily="50" charset="-127"/>
+                          </a:rPr>
+                          <m:t>𝑌</m:t>
+                        </m:r>
+                        <m:r>
+                          <a:rPr lang="en-US" altLang="ko-KR" sz="3600" b="0" i="1" smtClean="0">
+                            <a:latin typeface="Cambria Math" panose="02040503050406030204" pitchFamily="18" charset="0"/>
+                            <a:ea typeface="맑은 고딕" panose="020B0503020000020004" pitchFamily="50" charset="-127"/>
+                          </a:rPr>
+                          <m:t>]</m:t>
+                        </m:r>
+                      </m:den>
+                    </m:f>
+                    <m:r>
+                      <a:rPr lang="en-US" altLang="ko-KR" sz="3600" b="0" i="1" smtClean="0">
+                        <a:latin typeface="Cambria Math" panose="02040503050406030204" pitchFamily="18" charset="0"/>
+                        <a:ea typeface="맑은 고딕" panose="020B0503020000020004" pitchFamily="50" charset="-127"/>
+                      </a:rPr>
+                      <m:t>=</m:t>
+                    </m:r>
+                    <m:nary>
+                      <m:naryPr>
+                        <m:chr m:val="∑"/>
+                        <m:subHide m:val="on"/>
+                        <m:supHide m:val="on"/>
+                        <m:ctrlPr>
+                          <a:rPr lang="en-US" altLang="ko-KR" sz="3600" b="0" i="1" smtClean="0">
+                            <a:latin typeface="Cambria Math" panose="02040503050406030204" pitchFamily="18" charset="0"/>
+                            <a:ea typeface="맑은 고딕" panose="020B0503020000020004" pitchFamily="50" charset="-127"/>
+                          </a:rPr>
+                        </m:ctrlPr>
+                      </m:naryPr>
+                      <m:sub/>
+                      <m:sup/>
+                      <m:e>
+                        <m:f>
+                          <m:fPr>
+                            <m:ctrlPr>
+                              <a:rPr lang="en-US" altLang="ko-KR" sz="3600" b="0" i="1" smtClean="0">
+                                <a:latin typeface="Cambria Math" panose="02040503050406030204" pitchFamily="18" charset="0"/>
+                                <a:ea typeface="맑은 고딕" panose="020B0503020000020004" pitchFamily="50" charset="-127"/>
+                              </a:rPr>
+                            </m:ctrlPr>
+                          </m:fPr>
+                          <m:num>
+                            <m:r>
+                              <a:rPr lang="ko-KR" altLang="en-US" sz="3600" b="0" i="1" smtClean="0">
+                                <a:latin typeface="Cambria Math" panose="02040503050406030204" pitchFamily="18" charset="0"/>
+                                <a:ea typeface="맑은 고딕" panose="020B0503020000020004" pitchFamily="50" charset="-127"/>
+                              </a:rPr>
+                              <m:t>𝜕</m:t>
+                            </m:r>
+                            <m:r>
+                              <a:rPr lang="en-US" altLang="ko-KR" sz="3600" b="0" i="1" smtClean="0">
+                                <a:latin typeface="Cambria Math" panose="02040503050406030204" pitchFamily="18" charset="0"/>
+                                <a:ea typeface="맑은 고딕" panose="020B0503020000020004" pitchFamily="50" charset="-127"/>
+                              </a:rPr>
+                              <m:t>𝑙</m:t>
+                            </m:r>
+                          </m:num>
+                          <m:den>
+                            <m:r>
+                              <a:rPr lang="ko-KR" altLang="en-US" sz="3600" b="0" i="1" smtClean="0">
+                                <a:latin typeface="Cambria Math" panose="02040503050406030204" pitchFamily="18" charset="0"/>
+                                <a:ea typeface="맑은 고딕" panose="020B0503020000020004" pitchFamily="50" charset="-127"/>
+                              </a:rPr>
+                              <m:t>𝜕</m:t>
+                            </m:r>
+                            <m:r>
+                              <a:rPr lang="en-US" altLang="ko-KR" sz="3600" b="0" i="1" smtClean="0">
+                                <a:latin typeface="Cambria Math" panose="02040503050406030204" pitchFamily="18" charset="0"/>
+                                <a:ea typeface="맑은 고딕" panose="020B0503020000020004" pitchFamily="50" charset="-127"/>
+                              </a:rPr>
+                              <m:t>𝑌</m:t>
+                            </m:r>
+                            <m:r>
+                              <a:rPr lang="en-US" altLang="ko-KR" sz="3600" b="0" i="1" smtClean="0">
+                                <a:latin typeface="Cambria Math" panose="02040503050406030204" pitchFamily="18" charset="0"/>
+                                <a:ea typeface="맑은 고딕" panose="020B0503020000020004" pitchFamily="50" charset="-127"/>
+                              </a:rPr>
+                              <m:t>′</m:t>
+                            </m:r>
+                          </m:den>
+                        </m:f>
+                      </m:e>
+                    </m:nary>
+                    <m:r>
+                      <a:rPr lang="en-US" altLang="ko-KR" sz="3600" b="0" i="1" smtClean="0">
+                        <a:latin typeface="Cambria Math" panose="02040503050406030204" pitchFamily="18" charset="0"/>
+                        <a:ea typeface="맑은 고딕" panose="020B0503020000020004" pitchFamily="50" charset="-127"/>
+                      </a:rPr>
+                      <m:t> ∗−1</m:t>
+                    </m:r>
+                  </m:oMath>
+                </a14:m>
+                <a:endParaRPr lang="en-US" altLang="ko-KR" sz="3600" dirty="0">
+                  <a:latin typeface="맑은 고딕" panose="020B0503020000020004" pitchFamily="50" charset="-127"/>
+                  <a:ea typeface="맑은 고딕" panose="020B0503020000020004" pitchFamily="50" charset="-127"/>
+                </a:endParaRPr>
+              </a:p>
+              <a:p>
+                <a14:m>
+                  <m:oMath xmlns:m="http://schemas.openxmlformats.org/officeDocument/2006/math">
+                    <m:f>
+                      <m:fPr>
+                        <m:ctrlPr>
+                          <a:rPr lang="en-US" altLang="ko-KR" sz="3600" i="1" smtClean="0">
+                            <a:latin typeface="Cambria Math" panose="02040503050406030204" pitchFamily="18" charset="0"/>
+                            <a:ea typeface="맑은 고딕" panose="020B0503020000020004" pitchFamily="50" charset="-127"/>
+                          </a:rPr>
+                        </m:ctrlPr>
+                      </m:fPr>
+                      <m:num>
+                        <m:r>
+                          <a:rPr lang="ko-KR" altLang="en-US" sz="3600" i="1" smtClean="0">
+                            <a:latin typeface="Cambria Math" panose="02040503050406030204" pitchFamily="18" charset="0"/>
+                            <a:ea typeface="맑은 고딕" panose="020B0503020000020004" pitchFamily="50" charset="-127"/>
+                          </a:rPr>
+                          <m:t>𝜕</m:t>
+                        </m:r>
+                        <m:r>
+                          <a:rPr lang="en-US" altLang="ko-KR" sz="3600" b="0" i="1" smtClean="0">
+                            <a:latin typeface="Cambria Math" panose="02040503050406030204" pitchFamily="18" charset="0"/>
+                            <a:ea typeface="맑은 고딕" panose="020B0503020000020004" pitchFamily="50" charset="-127"/>
+                          </a:rPr>
+                          <m:t>𝑙</m:t>
+                        </m:r>
+                      </m:num>
+                      <m:den>
+                        <m:r>
+                          <a:rPr lang="ko-KR" altLang="en-US" sz="3600" i="1" smtClean="0">
+                            <a:latin typeface="Cambria Math" panose="02040503050406030204" pitchFamily="18" charset="0"/>
+                            <a:ea typeface="맑은 고딕" panose="020B0503020000020004" pitchFamily="50" charset="-127"/>
+                          </a:rPr>
+                          <m:t>𝜕</m:t>
+                        </m:r>
+                        <m:r>
+                          <a:rPr lang="en-US" altLang="ko-KR" sz="3600" b="0" i="1" smtClean="0">
+                            <a:latin typeface="Cambria Math" panose="02040503050406030204" pitchFamily="18" charset="0"/>
+                            <a:ea typeface="맑은 고딕" panose="020B0503020000020004" pitchFamily="50" charset="-127"/>
+                          </a:rPr>
+                          <m:t>𝑏</m:t>
+                        </m:r>
+                      </m:den>
+                    </m:f>
+                    <m:r>
+                      <a:rPr lang="en-US" altLang="ko-KR" sz="3600" b="0" i="1" smtClean="0">
+                        <a:latin typeface="Cambria Math" panose="02040503050406030204" pitchFamily="18" charset="0"/>
+                        <a:ea typeface="맑은 고딕" panose="020B0503020000020004" pitchFamily="50" charset="-127"/>
+                      </a:rPr>
+                      <m:t>=</m:t>
+                    </m:r>
+                    <m:f>
+                      <m:fPr>
+                        <m:ctrlPr>
+                          <a:rPr lang="en-US" altLang="ko-KR" sz="3600" i="1">
+                            <a:latin typeface="Cambria Math" panose="02040503050406030204" pitchFamily="18" charset="0"/>
+                          </a:rPr>
+                        </m:ctrlPr>
+                      </m:fPr>
+                      <m:num>
+                        <m:r>
+                          <a:rPr lang="ko-KR" altLang="en-US" sz="3600" i="1">
+                            <a:latin typeface="Cambria Math" panose="02040503050406030204" pitchFamily="18" charset="0"/>
+                          </a:rPr>
+                          <m:t>𝜕</m:t>
+                        </m:r>
+                        <m:r>
+                          <a:rPr lang="en-US" altLang="ko-KR" sz="3600" i="1">
+                            <a:latin typeface="Cambria Math" panose="02040503050406030204" pitchFamily="18" charset="0"/>
+                          </a:rPr>
+                          <m:t>𝑙</m:t>
+                        </m:r>
+                      </m:num>
+                      <m:den>
+                        <m:r>
+                          <a:rPr lang="ko-KR" altLang="en-US" sz="3600" i="1">
+                            <a:latin typeface="Cambria Math" panose="02040503050406030204" pitchFamily="18" charset="0"/>
+                          </a:rPr>
+                          <m:t>𝜕</m:t>
+                        </m:r>
+                        <m:r>
+                          <a:rPr lang="en-US" altLang="ko-KR" sz="3600" b="0" i="1" smtClean="0">
+                            <a:latin typeface="Cambria Math" panose="02040503050406030204" pitchFamily="18" charset="0"/>
+                          </a:rPr>
+                          <m:t>𝑌</m:t>
+                        </m:r>
+                      </m:den>
+                    </m:f>
+                    <m:r>
+                      <a:rPr lang="en-US" altLang="ko-KR" sz="3600" b="0" i="1" smtClean="0">
+                        <a:latin typeface="Cambria Math" panose="02040503050406030204" pitchFamily="18" charset="0"/>
+                      </a:rPr>
+                      <m:t>+</m:t>
+                    </m:r>
+                    <m:f>
+                      <m:fPr>
+                        <m:ctrlPr>
+                          <a:rPr lang="en-US" altLang="ko-KR" sz="3600" i="1">
+                            <a:latin typeface="Cambria Math" panose="02040503050406030204" pitchFamily="18" charset="0"/>
+                          </a:rPr>
+                        </m:ctrlPr>
+                      </m:fPr>
+                      <m:num>
+                        <m:r>
+                          <a:rPr lang="ko-KR" altLang="en-US" sz="3600" i="1">
+                            <a:latin typeface="Cambria Math" panose="02040503050406030204" pitchFamily="18" charset="0"/>
+                          </a:rPr>
+                          <m:t>𝜕</m:t>
+                        </m:r>
+                        <m:r>
+                          <a:rPr lang="en-US" altLang="ko-KR" sz="3600" i="1">
+                            <a:latin typeface="Cambria Math" panose="02040503050406030204" pitchFamily="18" charset="0"/>
+                          </a:rPr>
+                          <m:t>𝑙</m:t>
+                        </m:r>
+                      </m:num>
+                      <m:den>
+                        <m:r>
+                          <a:rPr lang="ko-KR" altLang="en-US" sz="3600" i="1">
+                            <a:latin typeface="Cambria Math" panose="02040503050406030204" pitchFamily="18" charset="0"/>
+                          </a:rPr>
+                          <m:t>𝜕</m:t>
+                        </m:r>
+                        <m:r>
+                          <a:rPr lang="en-US" altLang="ko-KR" sz="3600" b="0" i="1" smtClean="0">
+                            <a:latin typeface="Cambria Math" panose="02040503050406030204" pitchFamily="18" charset="0"/>
+                          </a:rPr>
+                          <m:t>𝐸</m:t>
+                        </m:r>
+                        <m:r>
+                          <a:rPr lang="en-US" altLang="ko-KR" sz="3600" b="0" i="1" smtClean="0">
+                            <a:latin typeface="Cambria Math" panose="02040503050406030204" pitchFamily="18" charset="0"/>
+                          </a:rPr>
+                          <m:t>[</m:t>
+                        </m:r>
+                        <m:r>
+                          <a:rPr lang="en-US" altLang="ko-KR" sz="3600" b="0" i="1" smtClean="0">
+                            <a:latin typeface="Cambria Math" panose="02040503050406030204" pitchFamily="18" charset="0"/>
+                          </a:rPr>
+                          <m:t>𝑌</m:t>
+                        </m:r>
+                        <m:r>
+                          <a:rPr lang="en-US" altLang="ko-KR" sz="3600" b="0" i="1" smtClean="0">
+                            <a:latin typeface="Cambria Math" panose="02040503050406030204" pitchFamily="18" charset="0"/>
+                          </a:rPr>
+                          <m:t>]</m:t>
+                        </m:r>
+                      </m:den>
+                    </m:f>
+                    <m:r>
+                      <a:rPr lang="en-US" altLang="ko-KR" sz="3600" b="0" i="1" smtClean="0">
+                        <a:latin typeface="Cambria Math" panose="02040503050406030204" pitchFamily="18" charset="0"/>
+                      </a:rPr>
+                      <m:t>∗</m:t>
+                    </m:r>
+                    <m:f>
+                      <m:fPr>
+                        <m:ctrlPr>
+                          <a:rPr lang="en-US" altLang="ko-KR" sz="3600" b="0" i="1" smtClean="0">
+                            <a:latin typeface="Cambria Math" panose="02040503050406030204" pitchFamily="18" charset="0"/>
+                          </a:rPr>
+                        </m:ctrlPr>
+                      </m:fPr>
+                      <m:num>
+                        <m:r>
+                          <a:rPr lang="en-US" altLang="ko-KR" sz="3600" b="0" i="1" smtClean="0">
+                            <a:latin typeface="Cambria Math" panose="02040503050406030204" pitchFamily="18" charset="0"/>
+                          </a:rPr>
+                          <m:t>1</m:t>
+                        </m:r>
+                      </m:num>
+                      <m:den>
+                        <m:r>
+                          <a:rPr lang="en-US" altLang="ko-KR" sz="3600" b="0" i="1" smtClean="0">
+                            <a:latin typeface="Cambria Math" panose="02040503050406030204" pitchFamily="18" charset="0"/>
+                          </a:rPr>
+                          <m:t>𝑛</m:t>
+                        </m:r>
+                      </m:den>
+                    </m:f>
+                  </m:oMath>
+                </a14:m>
+                <a:endParaRPr lang="en-US" altLang="ko-KR" sz="3600" dirty="0">
+                  <a:latin typeface="맑은 고딕" panose="020B0503020000020004" pitchFamily="50" charset="-127"/>
+                  <a:ea typeface="맑은 고딕" panose="020B0503020000020004" pitchFamily="50" charset="-127"/>
+                </a:endParaRPr>
+              </a:p>
+              <a:p>
+                <a:endParaRPr lang="en-US" altLang="ko-KR" sz="3600" dirty="0">
+                  <a:latin typeface="맑은 고딕" panose="020B0503020000020004" pitchFamily="50" charset="-127"/>
+                  <a:ea typeface="맑은 고딕" panose="020B0503020000020004" pitchFamily="50" charset="-127"/>
+                </a:endParaRPr>
+              </a:p>
+              <a:p>
+                <a:r>
+                  <a:rPr lang="ko-KR" altLang="en-US" sz="3600" dirty="0">
+                    <a:latin typeface="맑은 고딕" panose="020B0503020000020004" pitchFamily="50" charset="-127"/>
+                    <a:ea typeface="맑은 고딕" panose="020B0503020000020004" pitchFamily="50" charset="-127"/>
+                  </a:rPr>
+                  <a:t>사실 </a:t>
+                </a:r>
+                <a:r>
+                  <a:rPr lang="en-US" altLang="ko-KR" sz="3600" dirty="0">
+                    <a:latin typeface="맑은 고딕" panose="020B0503020000020004" pitchFamily="50" charset="-127"/>
+                    <a:ea typeface="맑은 고딕" panose="020B0503020000020004" pitchFamily="50" charset="-127"/>
+                  </a:rPr>
+                  <a:t>b</a:t>
+                </a:r>
+                <a:r>
+                  <a:rPr lang="ko-KR" altLang="en-US" sz="3600" dirty="0">
+                    <a:latin typeface="맑은 고딕" panose="020B0503020000020004" pitchFamily="50" charset="-127"/>
+                    <a:ea typeface="맑은 고딕" panose="020B0503020000020004" pitchFamily="50" charset="-127"/>
+                  </a:rPr>
+                  <a:t>가 어떻게 변하든 </a:t>
+                </a:r>
+                <a:r>
+                  <a:rPr lang="en-US" altLang="ko-KR" sz="3600" dirty="0">
+                    <a:latin typeface="맑은 고딕" panose="020B0503020000020004" pitchFamily="50" charset="-127"/>
+                    <a:ea typeface="맑은 고딕" panose="020B0503020000020004" pitchFamily="50" charset="-127"/>
+                  </a:rPr>
+                  <a:t>Y’</a:t>
+                </a:r>
+                <a:r>
+                  <a:rPr lang="ko-KR" altLang="en-US" sz="3600" dirty="0">
+                    <a:latin typeface="맑은 고딕" panose="020B0503020000020004" pitchFamily="50" charset="-127"/>
+                    <a:ea typeface="맑은 고딕" panose="020B0503020000020004" pitchFamily="50" charset="-127"/>
+                  </a:rPr>
+                  <a:t>는 변함이 없다</a:t>
+                </a:r>
+                <a:r>
+                  <a:rPr lang="en-US" altLang="ko-KR" sz="3600" dirty="0">
+                    <a:latin typeface="맑은 고딕" panose="020B0503020000020004" pitchFamily="50" charset="-127"/>
+                    <a:ea typeface="맑은 고딕" panose="020B0503020000020004" pitchFamily="50" charset="-127"/>
+                  </a:rPr>
+                  <a:t>.</a:t>
+                </a:r>
+              </a:p>
+              <a:p>
+                <a14:m>
+                  <m:oMath xmlns:m="http://schemas.openxmlformats.org/officeDocument/2006/math">
+                    <m:r>
+                      <a:rPr lang="ko-KR" altLang="en-US" sz="3600" i="1" dirty="0" smtClean="0">
+                        <a:latin typeface="Cambria Math" panose="02040503050406030204" pitchFamily="18" charset="0"/>
+                      </a:rPr>
+                      <m:t>그</m:t>
+                    </m:r>
+                    <m:r>
+                      <a:rPr lang="ko-KR" altLang="en-US" sz="3600" i="1" dirty="0">
+                        <a:latin typeface="Cambria Math" panose="02040503050406030204" pitchFamily="18" charset="0"/>
+                      </a:rPr>
+                      <m:t>러</m:t>
+                    </m:r>
+                    <m:r>
+                      <a:rPr lang="ko-KR" altLang="en-US" sz="3600" i="1" dirty="0" smtClean="0">
+                        <a:latin typeface="Cambria Math" panose="02040503050406030204" pitchFamily="18" charset="0"/>
+                      </a:rPr>
+                      <m:t>면</m:t>
+                    </m:r>
+                    <m:r>
+                      <a:rPr lang="en-US" altLang="ko-KR" sz="3600" b="0" i="1" dirty="0" smtClean="0">
+                        <a:latin typeface="Cambria Math" panose="02040503050406030204" pitchFamily="18" charset="0"/>
+                      </a:rPr>
+                      <m:t> </m:t>
+                    </m:r>
+                    <m:f>
+                      <m:fPr>
+                        <m:ctrlPr>
+                          <a:rPr lang="en-US" altLang="ko-KR" sz="3600" i="1">
+                            <a:latin typeface="Cambria Math" panose="02040503050406030204" pitchFamily="18" charset="0"/>
+                          </a:rPr>
+                        </m:ctrlPr>
+                      </m:fPr>
+                      <m:num>
+                        <m:r>
+                          <a:rPr lang="ko-KR" altLang="en-US" sz="3600" i="1">
+                            <a:latin typeface="Cambria Math" panose="02040503050406030204" pitchFamily="18" charset="0"/>
+                          </a:rPr>
+                          <m:t>𝜕</m:t>
+                        </m:r>
+                        <m:r>
+                          <a:rPr lang="en-US" altLang="ko-KR" sz="3600" i="1">
+                            <a:latin typeface="Cambria Math" panose="02040503050406030204" pitchFamily="18" charset="0"/>
+                          </a:rPr>
+                          <m:t>𝑙</m:t>
+                        </m:r>
+                      </m:num>
+                      <m:den>
+                        <m:r>
+                          <a:rPr lang="ko-KR" altLang="en-US" sz="3600" i="1">
+                            <a:latin typeface="Cambria Math" panose="02040503050406030204" pitchFamily="18" charset="0"/>
+                          </a:rPr>
+                          <m:t>𝜕</m:t>
+                        </m:r>
+                        <m:r>
+                          <a:rPr lang="en-US" altLang="ko-KR" sz="3600" i="1">
+                            <a:latin typeface="Cambria Math" panose="02040503050406030204" pitchFamily="18" charset="0"/>
+                          </a:rPr>
+                          <m:t>𝑏</m:t>
+                        </m:r>
+                      </m:den>
+                    </m:f>
+                  </m:oMath>
+                </a14:m>
+                <a:r>
+                  <a:rPr lang="en-US" altLang="ko-KR" sz="3600" dirty="0">
+                    <a:latin typeface="맑은 고딕" panose="020B0503020000020004" pitchFamily="50" charset="-127"/>
+                    <a:ea typeface="맑은 고딕" panose="020B0503020000020004" pitchFamily="50" charset="-127"/>
+                  </a:rPr>
+                  <a:t> = 0?</a:t>
+                </a:r>
+              </a:p>
+            </p:txBody>
+          </p:sp>
+        </mc:Choice>
+        <mc:Fallback>
+          <p:sp>
+            <p:nvSpPr>
+              <p:cNvPr id="3" name="내용 개체 틀 2">
+                <a:extLst>
+                  <a:ext uri="{FF2B5EF4-FFF2-40B4-BE49-F238E27FC236}">
+                    <a16:creationId xmlns:a16="http://schemas.microsoft.com/office/drawing/2014/main" id="{3CC461E5-B556-41EC-A6D9-6253D95057D4}"/>
+                  </a:ext>
+                </a:extLst>
+              </p:cNvPr>
+              <p:cNvSpPr>
+                <a:spLocks noGrp="1" noRot="1" noChangeAspect="1" noMove="1" noResize="1" noEditPoints="1" noAdjustHandles="1" noChangeArrowheads="1" noChangeShapeType="1" noTextEdit="1"/>
+              </p:cNvSpPr>
+              <p:nvPr>
+                <p:ph idx="1"/>
+              </p:nvPr>
+            </p:nvSpPr>
+            <p:spPr>
+              <a:blipFill>
+                <a:blip r:embed="rId2"/>
+                <a:stretch>
+                  <a:fillRect l="-970" t="-3939" b="-303"/>
+                </a:stretch>
+              </a:blipFill>
+            </p:spPr>
+            <p:txBody>
+              <a:bodyPr/>
+              <a:lstStyle/>
+              <a:p>
+                <a:r>
+                  <a:rPr lang="ko-KR" altLang="en-US">
+                    <a:noFill/>
+                  </a:rPr>
+                  <a:t> </a:t>
+                </a:r>
+              </a:p>
+            </p:txBody>
+          </p:sp>
+        </mc:Fallback>
+      </mc:AlternateContent>
+    </p:spTree>
+    <p:extLst>
+      <p:ext uri="{BB962C8B-B14F-4D97-AF65-F5344CB8AC3E}">
+        <p14:creationId xmlns:p14="http://schemas.microsoft.com/office/powerpoint/2010/main" val="2897721960"/>
+      </p:ext>
+    </p:extLst>
+  </p:cSld>
+  <p:clrMapOvr>
+    <a:masterClrMapping/>
+  </p:clrMapOvr>
+</p:sld>
+</file>
+
+<file path=ppt/slides/slide19.xml><?xml version="1.0" encoding="utf-8"?>
+<p:sld xmlns:a="http://schemas.openxmlformats.org/drawingml/2006/main" xmlns:r="http://schemas.openxmlformats.org/officeDocument/2006/relationships" xmlns:p="http://schemas.openxmlformats.org/presentationml/2006/main">
+  <p:cSld>
+    <p:spTree>
+      <p:nvGrpSpPr>
+        <p:cNvPr id="1" name=""/>
+        <p:cNvGrpSpPr/>
+        <p:nvPr/>
+      </p:nvGrpSpPr>
+      <p:grpSpPr>
+        <a:xfrm>
+          <a:off x="0" y="0"/>
+          <a:ext cx="0" cy="0"/>
+          <a:chOff x="0" y="0"/>
+          <a:chExt cx="0" cy="0"/>
+        </a:xfrm>
+      </p:grpSpPr>
+      <p:sp>
+        <p:nvSpPr>
+          <p:cNvPr id="2" name="제목 1">
+            <a:extLst>
+              <a:ext uri="{FF2B5EF4-FFF2-40B4-BE49-F238E27FC236}">
                 <a16:creationId xmlns:a16="http://schemas.microsoft.com/office/drawing/2014/main" id="{B1C9E45A-F5EA-440A-A9AC-81A8CFA4F565}"/>
               </a:ext>
             </a:extLst>
@@ -5645,6 +7603,467 @@
           <a:p>
             <a:r>
               <a:rPr lang="en-US" altLang="ko-KR" dirty="0"/>
+              <a:t>BN</a:t>
+            </a:r>
+            <a:r>
+              <a:rPr lang="ko-KR" altLang="en-US" dirty="0"/>
+              <a:t> </a:t>
+            </a:r>
+            <a:r>
+              <a:rPr lang="en-US" altLang="ko-KR" dirty="0"/>
+              <a:t>on</a:t>
+            </a:r>
+            <a:r>
+              <a:rPr lang="ko-KR" altLang="en-US" dirty="0"/>
+              <a:t> </a:t>
+            </a:r>
+            <a:r>
+              <a:rPr lang="en-US" altLang="ko-KR" dirty="0"/>
+              <a:t>CNN</a:t>
+            </a:r>
+          </a:p>
+          <a:p>
+            <a:endParaRPr lang="en-US" altLang="ko-KR" dirty="0"/>
+          </a:p>
+          <a:p>
+            <a:r>
+              <a:rPr lang="ko-KR" altLang="en-US" dirty="0"/>
+              <a:t>평균과 분산은 </a:t>
+            </a:r>
+            <a:r>
+              <a:rPr lang="en-US" altLang="ko-KR" dirty="0"/>
+              <a:t>feature map * mini-batch = m(mini-batch)</a:t>
+            </a:r>
+            <a:r>
+              <a:rPr lang="ko-KR" altLang="en-US" dirty="0"/>
+              <a:t> </a:t>
+            </a:r>
+            <a:r>
+              <a:rPr lang="en-US" altLang="ko-KR" dirty="0"/>
+              <a:t>*</a:t>
+            </a:r>
+            <a:r>
+              <a:rPr lang="ko-KR" altLang="en-US" dirty="0"/>
+              <a:t> </a:t>
+            </a:r>
+            <a:r>
+              <a:rPr lang="en-US" altLang="ko-KR" dirty="0"/>
+              <a:t>w(weight)</a:t>
+            </a:r>
+            <a:r>
+              <a:rPr lang="ko-KR" altLang="en-US" dirty="0"/>
+              <a:t> </a:t>
+            </a:r>
+            <a:r>
+              <a:rPr lang="en-US" altLang="ko-KR" dirty="0"/>
+              <a:t>*</a:t>
+            </a:r>
+            <a:r>
+              <a:rPr lang="ko-KR" altLang="en-US" dirty="0"/>
+              <a:t> </a:t>
+            </a:r>
+            <a:r>
+              <a:rPr lang="en-US" altLang="ko-KR" dirty="0"/>
+              <a:t>h(height)</a:t>
+            </a:r>
+            <a:r>
+              <a:rPr lang="ko-KR" altLang="en-US" dirty="0"/>
+              <a:t> 만큼의 </a:t>
+            </a:r>
+            <a:r>
+              <a:rPr lang="en-US" altLang="ko-KR" dirty="0"/>
+              <a:t>elements</a:t>
+            </a:r>
+            <a:r>
+              <a:rPr lang="ko-KR" altLang="en-US" dirty="0"/>
+              <a:t>를 이용해 구한다</a:t>
+            </a:r>
+            <a:r>
+              <a:rPr lang="en-US" altLang="ko-KR" dirty="0"/>
+              <a:t>.</a:t>
+            </a:r>
+          </a:p>
+          <a:p>
+            <a:r>
+              <a:rPr lang="el-GR" altLang="ko-KR" dirty="0">
+                <a:ea typeface="맑은 고딕" panose="020B0503020000020004" pitchFamily="50" charset="-127"/>
+              </a:rPr>
+              <a:t>Γ</a:t>
+            </a:r>
+            <a:r>
+              <a:rPr lang="en-US" altLang="ko-KR" dirty="0">
+                <a:ea typeface="맑은 고딕" panose="020B0503020000020004" pitchFamily="50" charset="-127"/>
+              </a:rPr>
+              <a:t>,</a:t>
+            </a:r>
+            <a:r>
+              <a:rPr lang="ko-KR" altLang="en-US" dirty="0">
+                <a:ea typeface="맑은 고딕" panose="020B0503020000020004" pitchFamily="50" charset="-127"/>
+              </a:rPr>
+              <a:t> </a:t>
+            </a:r>
+            <a:r>
+              <a:rPr lang="el-GR" altLang="ko-KR" dirty="0">
+                <a:ea typeface="맑은 고딕" panose="020B0503020000020004" pitchFamily="50" charset="-127"/>
+              </a:rPr>
+              <a:t>β</a:t>
+            </a:r>
+            <a:r>
+              <a:rPr lang="ko-KR" altLang="en-US" dirty="0">
+                <a:ea typeface="맑은 고딕" panose="020B0503020000020004" pitchFamily="50" charset="-127"/>
+              </a:rPr>
+              <a:t>는 </a:t>
+            </a:r>
+            <a:r>
+              <a:rPr lang="ko-KR" altLang="en-US" dirty="0"/>
+              <a:t>각각의 </a:t>
+            </a:r>
+            <a:r>
+              <a:rPr lang="en-US" altLang="ko-KR" dirty="0"/>
+              <a:t>feature-map</a:t>
+            </a:r>
+            <a:r>
+              <a:rPr lang="ko-KR" altLang="en-US" dirty="0"/>
+              <a:t>에 적용한다</a:t>
+            </a:r>
+            <a:r>
+              <a:rPr lang="en-US" altLang="ko-KR" dirty="0"/>
+              <a:t>.</a:t>
+            </a:r>
+            <a:endParaRPr lang="ko-KR" altLang="en-US" dirty="0"/>
+          </a:p>
+        </p:txBody>
+      </p:sp>
+    </p:spTree>
+    <p:extLst>
+      <p:ext uri="{BB962C8B-B14F-4D97-AF65-F5344CB8AC3E}">
+        <p14:creationId xmlns:p14="http://schemas.microsoft.com/office/powerpoint/2010/main" val="1670047476"/>
+      </p:ext>
+    </p:extLst>
+  </p:cSld>
+  <p:clrMapOvr>
+    <a:masterClrMapping/>
+  </p:clrMapOvr>
+</p:sld>
+</file>
+
+<file path=ppt/slides/slide2.xml><?xml version="1.0" encoding="utf-8"?>
+<p:sld xmlns:a="http://schemas.openxmlformats.org/drawingml/2006/main" xmlns:r="http://schemas.openxmlformats.org/officeDocument/2006/relationships" xmlns:p="http://schemas.openxmlformats.org/presentationml/2006/main">
+  <p:cSld>
+    <p:spTree>
+      <p:nvGrpSpPr>
+        <p:cNvPr id="1" name=""/>
+        <p:cNvGrpSpPr/>
+        <p:nvPr/>
+      </p:nvGrpSpPr>
+      <p:grpSpPr>
+        <a:xfrm>
+          <a:off x="0" y="0"/>
+          <a:ext cx="0" cy="0"/>
+          <a:chOff x="0" y="0"/>
+          <a:chExt cx="0" cy="0"/>
+        </a:xfrm>
+      </p:grpSpPr>
+      <p:sp>
+        <p:nvSpPr>
+          <p:cNvPr id="2" name="제목 1">
+            <a:extLst>
+              <a:ext uri="{FF2B5EF4-FFF2-40B4-BE49-F238E27FC236}">
+                <a16:creationId xmlns:a16="http://schemas.microsoft.com/office/drawing/2014/main" id="{FC7CA372-F405-4810-AE75-79F5EB8B9B69}"/>
+              </a:ext>
+            </a:extLst>
+          </p:cNvPr>
+          <p:cNvSpPr>
+            <a:spLocks noGrp="1"/>
+          </p:cNvSpPr>
+          <p:nvPr>
+            <p:ph type="title"/>
+          </p:nvPr>
+        </p:nvSpPr>
+        <p:spPr/>
+        <p:txBody>
+          <a:bodyPr/>
+          <a:lstStyle/>
+          <a:p>
+            <a:r>
+              <a:rPr lang="en-US" altLang="ko-KR" dirty="0"/>
+              <a:t>Contents</a:t>
+            </a:r>
+            <a:endParaRPr lang="ko-KR" altLang="en-US" dirty="0"/>
+          </a:p>
+        </p:txBody>
+      </p:sp>
+      <p:sp>
+        <p:nvSpPr>
+          <p:cNvPr id="3" name="내용 개체 틀 2">
+            <a:extLst>
+              <a:ext uri="{FF2B5EF4-FFF2-40B4-BE49-F238E27FC236}">
+                <a16:creationId xmlns:a16="http://schemas.microsoft.com/office/drawing/2014/main" id="{CC01B8E2-615B-4D25-BA74-9110BF0BEAE8}"/>
+              </a:ext>
+            </a:extLst>
+          </p:cNvPr>
+          <p:cNvSpPr>
+            <a:spLocks noGrp="1"/>
+          </p:cNvSpPr>
+          <p:nvPr>
+            <p:ph idx="1"/>
+          </p:nvPr>
+        </p:nvSpPr>
+        <p:spPr/>
+        <p:txBody>
+          <a:bodyPr/>
+          <a:lstStyle/>
+          <a:p>
+            <a:r>
+              <a:rPr lang="en-US" altLang="ko-KR" dirty="0"/>
+              <a:t>0. Regularization</a:t>
+            </a:r>
+          </a:p>
+          <a:p>
+            <a:r>
+              <a:rPr lang="en-US" altLang="ko-KR" dirty="0"/>
+              <a:t>1. Dropout</a:t>
+            </a:r>
+          </a:p>
+          <a:p>
+            <a:r>
+              <a:rPr lang="en-US" altLang="ko-KR" dirty="0"/>
+              <a:t>2. Batch-Normalization</a:t>
+            </a:r>
+          </a:p>
+          <a:p>
+            <a:r>
+              <a:rPr lang="en-US" altLang="ko-KR" dirty="0"/>
+              <a:t>3. Result</a:t>
+            </a:r>
+            <a:endParaRPr lang="ko-KR" altLang="en-US" dirty="0"/>
+          </a:p>
+        </p:txBody>
+      </p:sp>
+    </p:spTree>
+    <p:extLst>
+      <p:ext uri="{BB962C8B-B14F-4D97-AF65-F5344CB8AC3E}">
+        <p14:creationId xmlns:p14="http://schemas.microsoft.com/office/powerpoint/2010/main" val="4142494983"/>
+      </p:ext>
+    </p:extLst>
+  </p:cSld>
+  <p:clrMapOvr>
+    <a:masterClrMapping/>
+  </p:clrMapOvr>
+</p:sld>
+</file>
+
+<file path=ppt/slides/slide20.xml><?xml version="1.0" encoding="utf-8"?>
+<p:sld xmlns:a="http://schemas.openxmlformats.org/drawingml/2006/main" xmlns:r="http://schemas.openxmlformats.org/officeDocument/2006/relationships" xmlns:p="http://schemas.openxmlformats.org/presentationml/2006/main">
+  <p:cSld>
+    <p:spTree>
+      <p:nvGrpSpPr>
+        <p:cNvPr id="1" name=""/>
+        <p:cNvGrpSpPr/>
+        <p:nvPr/>
+      </p:nvGrpSpPr>
+      <p:grpSpPr>
+        <a:xfrm>
+          <a:off x="0" y="0"/>
+          <a:ext cx="0" cy="0"/>
+          <a:chOff x="0" y="0"/>
+          <a:chExt cx="0" cy="0"/>
+        </a:xfrm>
+      </p:grpSpPr>
+      <p:sp>
+        <p:nvSpPr>
+          <p:cNvPr id="2" name="제목 1">
+            <a:extLst>
+              <a:ext uri="{FF2B5EF4-FFF2-40B4-BE49-F238E27FC236}">
+                <a16:creationId xmlns:a16="http://schemas.microsoft.com/office/drawing/2014/main" id="{B1C9E45A-F5EA-440A-A9AC-81A8CFA4F565}"/>
+              </a:ext>
+            </a:extLst>
+          </p:cNvPr>
+          <p:cNvSpPr>
+            <a:spLocks noGrp="1"/>
+          </p:cNvSpPr>
+          <p:nvPr>
+            <p:ph type="title"/>
+          </p:nvPr>
+        </p:nvSpPr>
+        <p:spPr/>
+        <p:txBody>
+          <a:bodyPr/>
+          <a:lstStyle/>
+          <a:p>
+            <a:r>
+              <a:rPr lang="en-US" altLang="ko-KR" dirty="0"/>
+              <a:t>Batch-Normalization</a:t>
+            </a:r>
+            <a:endParaRPr lang="ko-KR" altLang="en-US" dirty="0"/>
+          </a:p>
+        </p:txBody>
+      </p:sp>
+      <p:sp>
+        <p:nvSpPr>
+          <p:cNvPr id="3" name="내용 개체 틀 2">
+            <a:extLst>
+              <a:ext uri="{FF2B5EF4-FFF2-40B4-BE49-F238E27FC236}">
+                <a16:creationId xmlns:a16="http://schemas.microsoft.com/office/drawing/2014/main" id="{12BC1828-6619-4305-8D66-B3B82EC770A8}"/>
+              </a:ext>
+            </a:extLst>
+          </p:cNvPr>
+          <p:cNvSpPr>
+            <a:spLocks noGrp="1"/>
+          </p:cNvSpPr>
+          <p:nvPr>
+            <p:ph idx="1"/>
+          </p:nvPr>
+        </p:nvSpPr>
+        <p:spPr/>
+        <p:txBody>
+          <a:bodyPr/>
+          <a:lstStyle/>
+          <a:p>
+            <a:r>
+              <a:rPr lang="en-US" altLang="ko-KR" dirty="0"/>
+              <a:t>Test </a:t>
+            </a:r>
+            <a:r>
+              <a:rPr lang="ko-KR" altLang="en-US" dirty="0"/>
+              <a:t>단계</a:t>
+            </a:r>
+            <a:endParaRPr lang="en-US" altLang="ko-KR" dirty="0"/>
+          </a:p>
+          <a:p>
+            <a:endParaRPr lang="en-US" altLang="ko-KR" dirty="0"/>
+          </a:p>
+          <a:p>
+            <a:r>
+              <a:rPr lang="en-US" altLang="ko-KR" dirty="0"/>
+              <a:t>Normalization</a:t>
+            </a:r>
+            <a:r>
+              <a:rPr lang="ko-KR" altLang="en-US" dirty="0"/>
+              <a:t>에 필요한 </a:t>
+            </a:r>
+            <a:r>
+              <a:rPr lang="en-US" altLang="ko-KR" dirty="0"/>
+              <a:t>mean, variance</a:t>
+            </a:r>
+            <a:r>
+              <a:rPr lang="ko-KR" altLang="en-US" dirty="0"/>
+              <a:t>를</a:t>
+            </a:r>
+            <a:r>
+              <a:rPr lang="en-US" altLang="ko-KR" dirty="0"/>
+              <a:t>,  </a:t>
+            </a:r>
+            <a:r>
+              <a:rPr lang="ko-KR" altLang="en-US" dirty="0"/>
+              <a:t>그동안 계산했던 </a:t>
+            </a:r>
+            <a:r>
+              <a:rPr lang="en-US" altLang="ko-KR" dirty="0"/>
+              <a:t>mean, variance</a:t>
+            </a:r>
+            <a:r>
+              <a:rPr lang="ko-KR" altLang="en-US" dirty="0"/>
+              <a:t>의 평균으로 놓고 </a:t>
+            </a:r>
+            <a:r>
+              <a:rPr lang="en-US" altLang="ko-KR" dirty="0"/>
+              <a:t>output</a:t>
+            </a:r>
+            <a:r>
+              <a:rPr lang="ko-KR" altLang="en-US" dirty="0"/>
+              <a:t>을 구한다</a:t>
+            </a:r>
+            <a:r>
+              <a:rPr lang="en-US" altLang="ko-KR" dirty="0"/>
+              <a:t>.</a:t>
+            </a:r>
+            <a:endParaRPr lang="ko-KR" altLang="en-US" dirty="0"/>
+          </a:p>
+        </p:txBody>
+      </p:sp>
+    </p:spTree>
+    <p:extLst>
+      <p:ext uri="{BB962C8B-B14F-4D97-AF65-F5344CB8AC3E}">
+        <p14:creationId xmlns:p14="http://schemas.microsoft.com/office/powerpoint/2010/main" val="209752006"/>
+      </p:ext>
+    </p:extLst>
+  </p:cSld>
+  <p:clrMapOvr>
+    <a:masterClrMapping/>
+  </p:clrMapOvr>
+</p:sld>
+</file>
+
+<file path=ppt/slides/slide21.xml><?xml version="1.0" encoding="utf-8"?>
+<p:sld xmlns:a="http://schemas.openxmlformats.org/drawingml/2006/main" xmlns:r="http://schemas.openxmlformats.org/officeDocument/2006/relationships" xmlns:p="http://schemas.openxmlformats.org/presentationml/2006/main">
+  <p:cSld>
+    <p:spTree>
+      <p:nvGrpSpPr>
+        <p:cNvPr id="1" name=""/>
+        <p:cNvGrpSpPr/>
+        <p:nvPr/>
+      </p:nvGrpSpPr>
+      <p:grpSpPr>
+        <a:xfrm>
+          <a:off x="0" y="0"/>
+          <a:ext cx="0" cy="0"/>
+          <a:chOff x="0" y="0"/>
+          <a:chExt cx="0" cy="0"/>
+        </a:xfrm>
+      </p:grpSpPr>
+      <p:sp>
+        <p:nvSpPr>
+          <p:cNvPr id="2" name="제목 1">
+            <a:extLst>
+              <a:ext uri="{FF2B5EF4-FFF2-40B4-BE49-F238E27FC236}">
+                <a16:creationId xmlns:a16="http://schemas.microsoft.com/office/drawing/2014/main" id="{B1C9E45A-F5EA-440A-A9AC-81A8CFA4F565}"/>
+              </a:ext>
+            </a:extLst>
+          </p:cNvPr>
+          <p:cNvSpPr>
+            <a:spLocks noGrp="1"/>
+          </p:cNvSpPr>
+          <p:nvPr>
+            <p:ph type="title"/>
+          </p:nvPr>
+        </p:nvSpPr>
+        <p:spPr/>
+        <p:txBody>
+          <a:bodyPr/>
+          <a:lstStyle/>
+          <a:p>
+            <a:r>
+              <a:rPr lang="en-US" altLang="ko-KR" dirty="0"/>
+              <a:t>Batch-Normalization</a:t>
+            </a:r>
+            <a:endParaRPr lang="ko-KR" altLang="en-US" dirty="0"/>
+          </a:p>
+        </p:txBody>
+      </p:sp>
+      <p:sp>
+        <p:nvSpPr>
+          <p:cNvPr id="3" name="내용 개체 틀 2">
+            <a:extLst>
+              <a:ext uri="{FF2B5EF4-FFF2-40B4-BE49-F238E27FC236}">
+                <a16:creationId xmlns:a16="http://schemas.microsoft.com/office/drawing/2014/main" id="{12BC1828-6619-4305-8D66-B3B82EC770A8}"/>
+              </a:ext>
+            </a:extLst>
+          </p:cNvPr>
+          <p:cNvSpPr>
+            <a:spLocks noGrp="1"/>
+          </p:cNvSpPr>
+          <p:nvPr>
+            <p:ph idx="1"/>
+          </p:nvPr>
+        </p:nvSpPr>
+        <p:spPr/>
+        <p:txBody>
+          <a:bodyPr/>
+          <a:lstStyle/>
+          <a:p>
+            <a:r>
+              <a:rPr lang="en-US" altLang="ko-KR" dirty="0"/>
               <a:t>Higher learning rate</a:t>
             </a:r>
           </a:p>
@@ -5681,7 +8100,7 @@
 </p:sld>
 </file>
 
-<file path=ppt/slides/slide19.xml><?xml version="1.0" encoding="utf-8"?>
+<file path=ppt/slides/slide22.xml><?xml version="1.0" encoding="utf-8"?>
 <p:sld xmlns:a="http://schemas.openxmlformats.org/drawingml/2006/main" xmlns:r="http://schemas.openxmlformats.org/officeDocument/2006/relationships" xmlns:p="http://schemas.openxmlformats.org/presentationml/2006/main">
   <p:cSld>
     <p:spTree>
@@ -5769,113 +8188,7 @@
 </p:sld>
 </file>
 
-<file path=ppt/slides/slide2.xml><?xml version="1.0" encoding="utf-8"?>
-<p:sld xmlns:a="http://schemas.openxmlformats.org/drawingml/2006/main" xmlns:r="http://schemas.openxmlformats.org/officeDocument/2006/relationships" xmlns:p="http://schemas.openxmlformats.org/presentationml/2006/main">
-  <p:cSld>
-    <p:spTree>
-      <p:nvGrpSpPr>
-        <p:cNvPr id="1" name=""/>
-        <p:cNvGrpSpPr/>
-        <p:nvPr/>
-      </p:nvGrpSpPr>
-      <p:grpSpPr>
-        <a:xfrm>
-          <a:off x="0" y="0"/>
-          <a:ext cx="0" cy="0"/>
-          <a:chOff x="0" y="0"/>
-          <a:chExt cx="0" cy="0"/>
-        </a:xfrm>
-      </p:grpSpPr>
-      <p:sp>
-        <p:nvSpPr>
-          <p:cNvPr id="2" name="제목 1">
-            <a:extLst>
-              <a:ext uri="{FF2B5EF4-FFF2-40B4-BE49-F238E27FC236}">
-                <a16:creationId xmlns:a16="http://schemas.microsoft.com/office/drawing/2014/main" id="{FC7CA372-F405-4810-AE75-79F5EB8B9B69}"/>
-              </a:ext>
-            </a:extLst>
-          </p:cNvPr>
-          <p:cNvSpPr>
-            <a:spLocks noGrp="1"/>
-          </p:cNvSpPr>
-          <p:nvPr>
-            <p:ph type="title"/>
-          </p:nvPr>
-        </p:nvSpPr>
-        <p:spPr/>
-        <p:txBody>
-          <a:bodyPr/>
-          <a:lstStyle/>
-          <a:p>
-            <a:r>
-              <a:rPr lang="en-US" altLang="ko-KR" dirty="0"/>
-              <a:t>Contents</a:t>
-            </a:r>
-            <a:endParaRPr lang="ko-KR" altLang="en-US" dirty="0"/>
-          </a:p>
-        </p:txBody>
-      </p:sp>
-      <p:sp>
-        <p:nvSpPr>
-          <p:cNvPr id="3" name="내용 개체 틀 2">
-            <a:extLst>
-              <a:ext uri="{FF2B5EF4-FFF2-40B4-BE49-F238E27FC236}">
-                <a16:creationId xmlns:a16="http://schemas.microsoft.com/office/drawing/2014/main" id="{CC01B8E2-615B-4D25-BA74-9110BF0BEAE8}"/>
-              </a:ext>
-            </a:extLst>
-          </p:cNvPr>
-          <p:cNvSpPr>
-            <a:spLocks noGrp="1"/>
-          </p:cNvSpPr>
-          <p:nvPr>
-            <p:ph idx="1"/>
-          </p:nvPr>
-        </p:nvSpPr>
-        <p:spPr/>
-        <p:txBody>
-          <a:bodyPr/>
-          <a:lstStyle/>
-          <a:p>
-            <a:r>
-              <a:rPr lang="en-US" altLang="ko-KR" dirty="0"/>
-              <a:t>0. Regularization</a:t>
-            </a:r>
-          </a:p>
-          <a:p>
-            <a:r>
-              <a:rPr lang="en-US" altLang="ko-KR" dirty="0"/>
-              <a:t>1. Dropout</a:t>
-            </a:r>
-          </a:p>
-          <a:p>
-            <a:r>
-              <a:rPr lang="en-US" altLang="ko-KR" dirty="0"/>
-              <a:t>2. Batch-Normalization</a:t>
-            </a:r>
-          </a:p>
-          <a:p>
-            <a:r>
-              <a:rPr lang="en-US" altLang="ko-KR" dirty="0"/>
-              <a:t>3. Result</a:t>
-            </a:r>
-            <a:endParaRPr lang="ko-KR" altLang="en-US" dirty="0"/>
-          </a:p>
-        </p:txBody>
-      </p:sp>
-    </p:spTree>
-    <p:extLst>
-      <p:ext uri="{BB962C8B-B14F-4D97-AF65-F5344CB8AC3E}">
-        <p14:creationId xmlns:p14="http://schemas.microsoft.com/office/powerpoint/2010/main" val="4142494983"/>
-      </p:ext>
-    </p:extLst>
-  </p:cSld>
-  <p:clrMapOvr>
-    <a:masterClrMapping/>
-  </p:clrMapOvr>
-</p:sld>
-</file>
-
-<file path=ppt/slides/slide20.xml><?xml version="1.0" encoding="utf-8"?>
+<file path=ppt/slides/slide23.xml><?xml version="1.0" encoding="utf-8"?>
 <p:sld xmlns:a="http://schemas.openxmlformats.org/drawingml/2006/main" xmlns:r="http://schemas.openxmlformats.org/officeDocument/2006/relationships" xmlns:p="http://schemas.openxmlformats.org/presentationml/2006/main">
   <p:cSld>
     <p:spTree>
@@ -6159,7 +8472,7 @@
 </p:sld>
 </file>
 
-<file path=ppt/slides/slide21.xml><?xml version="1.0" encoding="utf-8"?>
+<file path=ppt/slides/slide24.xml><?xml version="1.0" encoding="utf-8"?>
 <p:sld xmlns:a="http://schemas.openxmlformats.org/drawingml/2006/main" xmlns:r="http://schemas.openxmlformats.org/officeDocument/2006/relationships" xmlns:p="http://schemas.openxmlformats.org/presentationml/2006/main">
   <p:cSld>
     <p:spTree>
@@ -6520,7 +8833,7 @@
 </p:sld>
 </file>
 
-<file path=ppt/slides/slide22.xml><?xml version="1.0" encoding="utf-8"?>
+<file path=ppt/slides/slide25.xml><?xml version="1.0" encoding="utf-8"?>
 <p:sld xmlns:a="http://schemas.openxmlformats.org/drawingml/2006/main" xmlns:r="http://schemas.openxmlformats.org/officeDocument/2006/relationships" xmlns:p="http://schemas.openxmlformats.org/presentationml/2006/main">
   <p:cSld>
     <p:spTree>
@@ -6880,7 +9193,7 @@
 </p:sld>
 </file>
 
-<file path=ppt/slides/slide23.xml><?xml version="1.0" encoding="utf-8"?>
+<file path=ppt/slides/slide26.xml><?xml version="1.0" encoding="utf-8"?>
 <p:sld xmlns:a="http://schemas.openxmlformats.org/drawingml/2006/main" xmlns:r="http://schemas.openxmlformats.org/officeDocument/2006/relationships" xmlns:p="http://schemas.openxmlformats.org/presentationml/2006/main">
   <p:cSld>
     <p:spTree>
@@ -6946,7 +9259,7 @@
 </p:sld>
 </file>
 
-<file path=ppt/slides/slide24.xml><?xml version="1.0" encoding="utf-8"?>
+<file path=ppt/slides/slide27.xml><?xml version="1.0" encoding="utf-8"?>
 <p:sld xmlns:a="http://schemas.openxmlformats.org/drawingml/2006/main" xmlns:r="http://schemas.openxmlformats.org/officeDocument/2006/relationships" xmlns:p="http://schemas.openxmlformats.org/presentationml/2006/main">
   <p:cSld>
     <p:spTree>
@@ -7331,7 +9644,7 @@
           <a:graphicData uri="http://schemas.openxmlformats.org/presentationml/2006/ole">
             <mc:AlternateContent xmlns:mc="http://schemas.openxmlformats.org/markup-compatibility/2006">
               <mc:Choice xmlns:v="urn:schemas-microsoft-com:vml" Requires="v">
-                <p:oleObj spid="_x0000_s1028" name="수식" r:id="rId3" imgW="2717640" imgH="863280" progId="Equation.3">
+                <p:oleObj spid="_x0000_s1032" name="수식" r:id="rId3" imgW="2717640" imgH="863280" progId="Equation.3">
                   <p:embed/>
                 </p:oleObj>
               </mc:Choice>

</xml_diff>